<commit_message>
More work on 1.2
</commit_message>
<xml_diff>
--- a/Slides/Lesson1.2.pptx
+++ b/Slides/Lesson1.2.pptx
@@ -15,6 +15,11 @@
     <p:sldId id="263" r:id="rId9"/>
     <p:sldId id="264" r:id="rId10"/>
     <p:sldId id="265" r:id="rId11"/>
+    <p:sldId id="266" r:id="rId12"/>
+    <p:sldId id="267" r:id="rId13"/>
+    <p:sldId id="268" r:id="rId14"/>
+    <p:sldId id="270" r:id="rId15"/>
+    <p:sldId id="269" r:id="rId16"/>
   </p:sldIdLst>
   <p:sldSz cx="12192000" cy="6858000"/>
   <p:notesSz cx="6858000" cy="9144000"/>
@@ -6301,7 +6306,9 @@
         </p:nvSpPr>
         <p:spPr/>
         <p:txBody>
-          <a:bodyPr/>
+          <a:bodyPr>
+            <a:normAutofit fontScale="85000" lnSpcReduction="10000"/>
+          </a:bodyPr>
           <a:lstStyle/>
           <a:p>
             <a:r>
@@ -6367,7 +6374,14 @@
             <a:pPr lvl="1"/>
             <a:r>
               <a:rPr lang="en-US" dirty="0"/>
-              <a:t>Logical Operators (and, or, is equal to, not, is greater than, etc.)</a:t>
+              <a:t>Relational Operators (is equal to, is greater than, etc.)</a:t>
+            </a:r>
+          </a:p>
+          <a:p>
+            <a:pPr lvl="1"/>
+            <a:r>
+              <a:rPr lang="en-US" dirty="0"/>
+              <a:t>Logical Operators (and, or, not, etc.)</a:t>
             </a:r>
           </a:p>
           <a:p>
@@ -6375,6 +6389,20 @@
             <a:r>
               <a:rPr lang="en-US" dirty="0"/>
               <a:t>Assignment Operators</a:t>
+            </a:r>
+          </a:p>
+          <a:p>
+            <a:pPr lvl="1"/>
+            <a:r>
+              <a:rPr lang="en-US" dirty="0"/>
+              <a:t>Increment/Decrement Operators</a:t>
+            </a:r>
+          </a:p>
+          <a:p>
+            <a:pPr lvl="1"/>
+            <a:r>
+              <a:rPr lang="en-US" dirty="0"/>
+              <a:t>Bitwise Operators (these are not in the scope of this class)</a:t>
             </a:r>
           </a:p>
           <a:p>
@@ -6386,6 +6414,3964 @@
     <p:extLst>
       <p:ext uri="{BB962C8B-B14F-4D97-AF65-F5344CB8AC3E}">
         <p14:creationId xmlns:p14="http://schemas.microsoft.com/office/powerpoint/2010/main" val="3874420943"/>
+      </p:ext>
+    </p:extLst>
+  </p:cSld>
+  <p:clrMapOvr>
+    <a:masterClrMapping/>
+  </p:clrMapOvr>
+</p:sld>
+</file>
+
+<file path=ppt/slides/slide11.xml><?xml version="1.0" encoding="utf-8"?>
+<p:sld xmlns:a="http://schemas.openxmlformats.org/drawingml/2006/main" xmlns:r="http://schemas.openxmlformats.org/officeDocument/2006/relationships" xmlns:p="http://schemas.openxmlformats.org/presentationml/2006/main">
+  <p:cSld>
+    <p:bg>
+      <p:bgPr>
+        <a:solidFill>
+          <a:schemeClr val="bg1"/>
+        </a:solidFill>
+        <a:effectLst/>
+      </p:bgPr>
+    </p:bg>
+    <p:spTree>
+      <p:nvGrpSpPr>
+        <p:cNvPr id="1" name=""/>
+        <p:cNvGrpSpPr/>
+        <p:nvPr/>
+      </p:nvGrpSpPr>
+      <p:grpSpPr>
+        <a:xfrm>
+          <a:off x="0" y="0"/>
+          <a:ext cx="0" cy="0"/>
+          <a:chOff x="0" y="0"/>
+          <a:chExt cx="0" cy="0"/>
+        </a:xfrm>
+      </p:grpSpPr>
+      <p:grpSp>
+        <p:nvGrpSpPr>
+          <p:cNvPr id="39" name="Group 24">
+            <a:extLst>
+              <a:ext uri="{FF2B5EF4-FFF2-40B4-BE49-F238E27FC236}">
+                <a16:creationId xmlns:a16="http://schemas.microsoft.com/office/drawing/2014/main" id="{A4D026A2-7476-44B0-9648-BB98882F7BA3}"/>
+              </a:ext>
+              <a:ext uri="{C183D7F6-B498-43B3-948B-1728B52AA6E4}">
+                <adec:decorative xmlns:adec="http://schemas.microsoft.com/office/drawing/2017/decorative" val="1"/>
+              </a:ext>
+            </a:extLst>
+          </p:cNvPr>
+          <p:cNvGrpSpPr>
+            <a:grpSpLocks noGrp="1" noUngrp="1" noRot="1" noChangeAspect="1" noMove="1" noResize="1"/>
+          </p:cNvGrpSpPr>
+          <p:nvPr>
+            <p:extLst>
+              <p:ext uri="{386F3935-93C4-4BCD-93E2-E3B085C9AB24}">
+                <p16:designElem xmlns:p16="http://schemas.microsoft.com/office/powerpoint/2015/main" val="1"/>
+              </p:ext>
+            </p:extLst>
+          </p:nvPr>
+        </p:nvGrpSpPr>
+        <p:grpSpPr>
+          <a:xfrm>
+            <a:off x="0" y="-8467"/>
+            <a:ext cx="12192000" cy="6866467"/>
+            <a:chOff x="0" y="-8467"/>
+            <a:chExt cx="12192000" cy="6866467"/>
+          </a:xfrm>
+        </p:grpSpPr>
+        <p:cxnSp>
+          <p:nvCxnSpPr>
+            <p:cNvPr id="26" name="Straight Connector 25">
+              <a:extLst>
+                <a:ext uri="{FF2B5EF4-FFF2-40B4-BE49-F238E27FC236}">
+                  <a16:creationId xmlns:a16="http://schemas.microsoft.com/office/drawing/2014/main" id="{48F8FC21-0A44-4045-95A1-B7935DBC603D}"/>
+                </a:ext>
+                <a:ext uri="{C183D7F6-B498-43B3-948B-1728B52AA6E4}">
+                  <adec:decorative xmlns:adec="http://schemas.microsoft.com/office/drawing/2017/decorative" val="1"/>
+                </a:ext>
+              </a:extLst>
+            </p:cNvPr>
+            <p:cNvCxnSpPr/>
+            <p:nvPr>
+              <p:extLst>
+                <p:ext uri="{386F3935-93C4-4BCD-93E2-E3B085C9AB24}">
+                  <p16:designElem xmlns:p16="http://schemas.microsoft.com/office/powerpoint/2015/main" val="1"/>
+                </p:ext>
+              </p:extLst>
+            </p:nvPr>
+          </p:nvCxnSpPr>
+          <p:spPr>
+            <a:xfrm>
+              <a:off x="9371012" y="0"/>
+              <a:ext cx="1219200" cy="6858000"/>
+            </a:xfrm>
+            <a:prstGeom prst="line">
+              <a:avLst/>
+            </a:prstGeom>
+            <a:ln w="9525">
+              <a:solidFill>
+                <a:schemeClr val="accent1">
+                  <a:alpha val="70000"/>
+                </a:schemeClr>
+              </a:solidFill>
+            </a:ln>
+          </p:spPr>
+          <p:style>
+            <a:lnRef idx="2">
+              <a:schemeClr val="accent1"/>
+            </a:lnRef>
+            <a:fillRef idx="0">
+              <a:schemeClr val="accent1"/>
+            </a:fillRef>
+            <a:effectRef idx="1">
+              <a:schemeClr val="accent1"/>
+            </a:effectRef>
+            <a:fontRef idx="minor">
+              <a:schemeClr val="tx1"/>
+            </a:fontRef>
+          </p:style>
+        </p:cxnSp>
+        <p:cxnSp>
+          <p:nvCxnSpPr>
+            <p:cNvPr id="27" name="Straight Connector 26">
+              <a:extLst>
+                <a:ext uri="{FF2B5EF4-FFF2-40B4-BE49-F238E27FC236}">
+                  <a16:creationId xmlns:a16="http://schemas.microsoft.com/office/drawing/2014/main" id="{0209B962-CD29-4D46-A7B0-10F6C7CF1C0F}"/>
+                </a:ext>
+                <a:ext uri="{C183D7F6-B498-43B3-948B-1728B52AA6E4}">
+                  <adec:decorative xmlns:adec="http://schemas.microsoft.com/office/drawing/2017/decorative" val="1"/>
+                </a:ext>
+              </a:extLst>
+            </p:cNvPr>
+            <p:cNvCxnSpPr/>
+            <p:nvPr>
+              <p:extLst>
+                <p:ext uri="{386F3935-93C4-4BCD-93E2-E3B085C9AB24}">
+                  <p16:designElem xmlns:p16="http://schemas.microsoft.com/office/powerpoint/2015/main" val="1"/>
+                </p:ext>
+              </p:extLst>
+            </p:nvPr>
+          </p:nvCxnSpPr>
+          <p:spPr>
+            <a:xfrm flipH="1">
+              <a:off x="7425267" y="3681413"/>
+              <a:ext cx="4763558" cy="3176587"/>
+            </a:xfrm>
+            <a:prstGeom prst="line">
+              <a:avLst/>
+            </a:prstGeom>
+            <a:ln w="9525">
+              <a:solidFill>
+                <a:schemeClr val="accent1">
+                  <a:alpha val="70000"/>
+                </a:schemeClr>
+              </a:solidFill>
+            </a:ln>
+          </p:spPr>
+          <p:style>
+            <a:lnRef idx="2">
+              <a:schemeClr val="accent1"/>
+            </a:lnRef>
+            <a:fillRef idx="0">
+              <a:schemeClr val="accent1"/>
+            </a:fillRef>
+            <a:effectRef idx="1">
+              <a:schemeClr val="accent1"/>
+            </a:effectRef>
+            <a:fontRef idx="minor">
+              <a:schemeClr val="tx1"/>
+            </a:fontRef>
+          </p:style>
+        </p:cxnSp>
+        <p:sp>
+          <p:nvSpPr>
+            <p:cNvPr id="28" name="Rectangle 23">
+              <a:extLst>
+                <a:ext uri="{FF2B5EF4-FFF2-40B4-BE49-F238E27FC236}">
+                  <a16:creationId xmlns:a16="http://schemas.microsoft.com/office/drawing/2014/main" id="{CC8D40CF-4D47-411D-A8B7-0E4B29E9832B}"/>
+                </a:ext>
+                <a:ext uri="{C183D7F6-B498-43B3-948B-1728B52AA6E4}">
+                  <adec:decorative xmlns:adec="http://schemas.microsoft.com/office/drawing/2017/decorative" val="1"/>
+                </a:ext>
+              </a:extLst>
+            </p:cNvPr>
+            <p:cNvSpPr/>
+            <p:nvPr>
+              <p:extLst>
+                <p:ext uri="{386F3935-93C4-4BCD-93E2-E3B085C9AB24}">
+                  <p16:designElem xmlns:p16="http://schemas.microsoft.com/office/powerpoint/2015/main" val="1"/>
+                </p:ext>
+              </p:extLst>
+            </p:nvPr>
+          </p:nvSpPr>
+          <p:spPr>
+            <a:xfrm>
+              <a:off x="9181476" y="-8467"/>
+              <a:ext cx="3007349" cy="6866467"/>
+            </a:xfrm>
+            <a:custGeom>
+              <a:avLst/>
+              <a:gdLst/>
+              <a:ahLst/>
+              <a:cxnLst/>
+              <a:rect l="l" t="t" r="r" b="b"/>
+              <a:pathLst>
+                <a:path w="3007349" h="6866467">
+                  <a:moveTo>
+                    <a:pt x="2045532" y="0"/>
+                  </a:moveTo>
+                  <a:lnTo>
+                    <a:pt x="3007349" y="0"/>
+                  </a:lnTo>
+                  <a:lnTo>
+                    <a:pt x="3007349" y="6866467"/>
+                  </a:lnTo>
+                  <a:lnTo>
+                    <a:pt x="0" y="6866467"/>
+                  </a:lnTo>
+                  <a:lnTo>
+                    <a:pt x="2045532" y="0"/>
+                  </a:lnTo>
+                  <a:close/>
+                </a:path>
+              </a:pathLst>
+            </a:custGeom>
+            <a:solidFill>
+              <a:schemeClr val="accent1">
+                <a:alpha val="36000"/>
+              </a:schemeClr>
+            </a:solidFill>
+            <a:ln>
+              <a:noFill/>
+            </a:ln>
+            <a:effectLst/>
+          </p:spPr>
+          <p:style>
+            <a:lnRef idx="1">
+              <a:schemeClr val="accent1"/>
+            </a:lnRef>
+            <a:fillRef idx="3">
+              <a:schemeClr val="accent1"/>
+            </a:fillRef>
+            <a:effectRef idx="2">
+              <a:schemeClr val="accent1"/>
+            </a:effectRef>
+            <a:fontRef idx="minor">
+              <a:schemeClr val="lt1"/>
+            </a:fontRef>
+          </p:style>
+        </p:sp>
+        <p:sp>
+          <p:nvSpPr>
+            <p:cNvPr id="29" name="Rectangle 25">
+              <a:extLst>
+                <a:ext uri="{FF2B5EF4-FFF2-40B4-BE49-F238E27FC236}">
+                  <a16:creationId xmlns:a16="http://schemas.microsoft.com/office/drawing/2014/main" id="{9B48A2AD-5257-4384-A7F5-A1EE4E6883A5}"/>
+                </a:ext>
+                <a:ext uri="{C183D7F6-B498-43B3-948B-1728B52AA6E4}">
+                  <adec:decorative xmlns:adec="http://schemas.microsoft.com/office/drawing/2017/decorative" val="1"/>
+                </a:ext>
+              </a:extLst>
+            </p:cNvPr>
+            <p:cNvSpPr/>
+            <p:nvPr>
+              <p:extLst>
+                <p:ext uri="{386F3935-93C4-4BCD-93E2-E3B085C9AB24}">
+                  <p16:designElem xmlns:p16="http://schemas.microsoft.com/office/powerpoint/2015/main" val="1"/>
+                </p:ext>
+              </p:extLst>
+            </p:nvPr>
+          </p:nvSpPr>
+          <p:spPr>
+            <a:xfrm>
+              <a:off x="9603442" y="-8467"/>
+              <a:ext cx="2588558" cy="6866467"/>
+            </a:xfrm>
+            <a:custGeom>
+              <a:avLst/>
+              <a:gdLst/>
+              <a:ahLst/>
+              <a:cxnLst/>
+              <a:rect l="l" t="t" r="r" b="b"/>
+              <a:pathLst>
+                <a:path w="2573311" h="6866467">
+                  <a:moveTo>
+                    <a:pt x="0" y="0"/>
+                  </a:moveTo>
+                  <a:lnTo>
+                    <a:pt x="2573311" y="0"/>
+                  </a:lnTo>
+                  <a:lnTo>
+                    <a:pt x="2573311" y="6866467"/>
+                  </a:lnTo>
+                  <a:lnTo>
+                    <a:pt x="1202336" y="6866467"/>
+                  </a:lnTo>
+                  <a:lnTo>
+                    <a:pt x="0" y="0"/>
+                  </a:lnTo>
+                  <a:close/>
+                </a:path>
+              </a:pathLst>
+            </a:custGeom>
+            <a:solidFill>
+              <a:schemeClr val="accent1">
+                <a:alpha val="20000"/>
+              </a:schemeClr>
+            </a:solidFill>
+            <a:ln>
+              <a:noFill/>
+            </a:ln>
+            <a:effectLst/>
+          </p:spPr>
+          <p:style>
+            <a:lnRef idx="1">
+              <a:schemeClr val="accent1"/>
+            </a:lnRef>
+            <a:fillRef idx="3">
+              <a:schemeClr val="accent1"/>
+            </a:fillRef>
+            <a:effectRef idx="2">
+              <a:schemeClr val="accent1"/>
+            </a:effectRef>
+            <a:fontRef idx="minor">
+              <a:schemeClr val="lt1"/>
+            </a:fontRef>
+          </p:style>
+        </p:sp>
+        <p:sp>
+          <p:nvSpPr>
+            <p:cNvPr id="30" name="Isosceles Triangle 29">
+              <a:extLst>
+                <a:ext uri="{FF2B5EF4-FFF2-40B4-BE49-F238E27FC236}">
+                  <a16:creationId xmlns:a16="http://schemas.microsoft.com/office/drawing/2014/main" id="{04C26DE3-844C-47DA-831E-E7D7BF617EC2}"/>
+                </a:ext>
+                <a:ext uri="{C183D7F6-B498-43B3-948B-1728B52AA6E4}">
+                  <adec:decorative xmlns:adec="http://schemas.microsoft.com/office/drawing/2017/decorative" val="1"/>
+                </a:ext>
+              </a:extLst>
+            </p:cNvPr>
+            <p:cNvSpPr/>
+            <p:nvPr>
+              <p:extLst>
+                <p:ext uri="{386F3935-93C4-4BCD-93E2-E3B085C9AB24}">
+                  <p16:designElem xmlns:p16="http://schemas.microsoft.com/office/powerpoint/2015/main" val="1"/>
+                </p:ext>
+              </p:extLst>
+            </p:nvPr>
+          </p:nvSpPr>
+          <p:spPr>
+            <a:xfrm>
+              <a:off x="8932333" y="3048000"/>
+              <a:ext cx="3259667" cy="3810000"/>
+            </a:xfrm>
+            <a:prstGeom prst="triangle">
+              <a:avLst>
+                <a:gd name="adj" fmla="val 100000"/>
+              </a:avLst>
+            </a:prstGeom>
+            <a:solidFill>
+              <a:schemeClr val="accent1">
+                <a:lumMod val="75000"/>
+                <a:alpha val="66000"/>
+              </a:schemeClr>
+            </a:solidFill>
+            <a:ln>
+              <a:noFill/>
+            </a:ln>
+            <a:effectLst/>
+          </p:spPr>
+          <p:style>
+            <a:lnRef idx="1">
+              <a:schemeClr val="accent1"/>
+            </a:lnRef>
+            <a:fillRef idx="3">
+              <a:schemeClr val="accent1"/>
+            </a:fillRef>
+            <a:effectRef idx="2">
+              <a:schemeClr val="accent1"/>
+            </a:effectRef>
+            <a:fontRef idx="minor">
+              <a:schemeClr val="lt1"/>
+            </a:fontRef>
+          </p:style>
+        </p:sp>
+        <p:sp>
+          <p:nvSpPr>
+            <p:cNvPr id="31" name="Rectangle 27">
+              <a:extLst>
+                <a:ext uri="{FF2B5EF4-FFF2-40B4-BE49-F238E27FC236}">
+                  <a16:creationId xmlns:a16="http://schemas.microsoft.com/office/drawing/2014/main" id="{922D975E-0684-4AA6-9FB7-929B250D5389}"/>
+                </a:ext>
+                <a:ext uri="{C183D7F6-B498-43B3-948B-1728B52AA6E4}">
+                  <adec:decorative xmlns:adec="http://schemas.microsoft.com/office/drawing/2017/decorative" val="1"/>
+                </a:ext>
+              </a:extLst>
+            </p:cNvPr>
+            <p:cNvSpPr/>
+            <p:nvPr>
+              <p:extLst>
+                <p:ext uri="{386F3935-93C4-4BCD-93E2-E3B085C9AB24}">
+                  <p16:designElem xmlns:p16="http://schemas.microsoft.com/office/powerpoint/2015/main" val="1"/>
+                </p:ext>
+              </p:extLst>
+            </p:nvPr>
+          </p:nvSpPr>
+          <p:spPr>
+            <a:xfrm>
+              <a:off x="9334500" y="-8467"/>
+              <a:ext cx="2854326" cy="6866467"/>
+            </a:xfrm>
+            <a:custGeom>
+              <a:avLst/>
+              <a:gdLst/>
+              <a:ahLst/>
+              <a:cxnLst/>
+              <a:rect l="l" t="t" r="r" b="b"/>
+              <a:pathLst>
+                <a:path w="2858013" h="6866467">
+                  <a:moveTo>
+                    <a:pt x="0" y="0"/>
+                  </a:moveTo>
+                  <a:lnTo>
+                    <a:pt x="2858013" y="0"/>
+                  </a:lnTo>
+                  <a:lnTo>
+                    <a:pt x="2858013" y="6866467"/>
+                  </a:lnTo>
+                  <a:lnTo>
+                    <a:pt x="2473942" y="6866467"/>
+                  </a:lnTo>
+                  <a:lnTo>
+                    <a:pt x="0" y="0"/>
+                  </a:lnTo>
+                  <a:close/>
+                </a:path>
+              </a:pathLst>
+            </a:custGeom>
+            <a:solidFill>
+              <a:schemeClr val="accent1">
+                <a:lumMod val="75000"/>
+                <a:alpha val="50000"/>
+              </a:schemeClr>
+            </a:solidFill>
+            <a:ln>
+              <a:noFill/>
+            </a:ln>
+            <a:effectLst/>
+          </p:spPr>
+          <p:style>
+            <a:lnRef idx="1">
+              <a:schemeClr val="accent1"/>
+            </a:lnRef>
+            <a:fillRef idx="3">
+              <a:schemeClr val="accent1"/>
+            </a:fillRef>
+            <a:effectRef idx="2">
+              <a:schemeClr val="accent1"/>
+            </a:effectRef>
+            <a:fontRef idx="minor">
+              <a:schemeClr val="lt1"/>
+            </a:fontRef>
+          </p:style>
+        </p:sp>
+        <p:sp>
+          <p:nvSpPr>
+            <p:cNvPr id="32" name="Rectangle 28">
+              <a:extLst>
+                <a:ext uri="{FF2B5EF4-FFF2-40B4-BE49-F238E27FC236}">
+                  <a16:creationId xmlns:a16="http://schemas.microsoft.com/office/drawing/2014/main" id="{38ED5A9A-F0C7-4547-BC1E-22FC89BD26D1}"/>
+                </a:ext>
+                <a:ext uri="{C183D7F6-B498-43B3-948B-1728B52AA6E4}">
+                  <adec:decorative xmlns:adec="http://schemas.microsoft.com/office/drawing/2017/decorative" val="1"/>
+                </a:ext>
+              </a:extLst>
+            </p:cNvPr>
+            <p:cNvSpPr/>
+            <p:nvPr>
+              <p:extLst>
+                <p:ext uri="{386F3935-93C4-4BCD-93E2-E3B085C9AB24}">
+                  <p16:designElem xmlns:p16="http://schemas.microsoft.com/office/powerpoint/2015/main" val="1"/>
+                </p:ext>
+              </p:extLst>
+            </p:nvPr>
+          </p:nvSpPr>
+          <p:spPr>
+            <a:xfrm>
+              <a:off x="10898730" y="-8467"/>
+              <a:ext cx="1290094" cy="6866467"/>
+            </a:xfrm>
+            <a:custGeom>
+              <a:avLst/>
+              <a:gdLst/>
+              <a:ahLst/>
+              <a:cxnLst/>
+              <a:rect l="l" t="t" r="r" b="b"/>
+              <a:pathLst>
+                <a:path w="1290094" h="6858000">
+                  <a:moveTo>
+                    <a:pt x="1019735" y="0"/>
+                  </a:moveTo>
+                  <a:lnTo>
+                    <a:pt x="1290094" y="0"/>
+                  </a:lnTo>
+                  <a:lnTo>
+                    <a:pt x="1290094" y="6858000"/>
+                  </a:lnTo>
+                  <a:lnTo>
+                    <a:pt x="0" y="6858000"/>
+                  </a:lnTo>
+                  <a:lnTo>
+                    <a:pt x="1019735" y="0"/>
+                  </a:lnTo>
+                  <a:close/>
+                </a:path>
+              </a:pathLst>
+            </a:custGeom>
+            <a:solidFill>
+              <a:schemeClr val="accent2">
+                <a:alpha val="70000"/>
+              </a:schemeClr>
+            </a:solidFill>
+            <a:ln>
+              <a:noFill/>
+            </a:ln>
+            <a:effectLst/>
+          </p:spPr>
+          <p:style>
+            <a:lnRef idx="1">
+              <a:schemeClr val="accent1"/>
+            </a:lnRef>
+            <a:fillRef idx="3">
+              <a:schemeClr val="accent1"/>
+            </a:fillRef>
+            <a:effectRef idx="2">
+              <a:schemeClr val="accent1"/>
+            </a:effectRef>
+            <a:fontRef idx="minor">
+              <a:schemeClr val="lt1"/>
+            </a:fontRef>
+          </p:style>
+        </p:sp>
+        <p:sp>
+          <p:nvSpPr>
+            <p:cNvPr id="33" name="Rectangle 29">
+              <a:extLst>
+                <a:ext uri="{FF2B5EF4-FFF2-40B4-BE49-F238E27FC236}">
+                  <a16:creationId xmlns:a16="http://schemas.microsoft.com/office/drawing/2014/main" id="{2D743765-A245-4349-A5CE-4AB5F078F91E}"/>
+                </a:ext>
+                <a:ext uri="{C183D7F6-B498-43B3-948B-1728B52AA6E4}">
+                  <adec:decorative xmlns:adec="http://schemas.microsoft.com/office/drawing/2017/decorative" val="1"/>
+                </a:ext>
+              </a:extLst>
+            </p:cNvPr>
+            <p:cNvSpPr/>
+            <p:nvPr>
+              <p:extLst>
+                <p:ext uri="{386F3935-93C4-4BCD-93E2-E3B085C9AB24}">
+                  <p16:designElem xmlns:p16="http://schemas.microsoft.com/office/powerpoint/2015/main" val="1"/>
+                </p:ext>
+              </p:extLst>
+            </p:nvPr>
+          </p:nvSpPr>
+          <p:spPr>
+            <a:xfrm>
+              <a:off x="10938999" y="-8467"/>
+              <a:ext cx="1249825" cy="6866467"/>
+            </a:xfrm>
+            <a:custGeom>
+              <a:avLst/>
+              <a:gdLst/>
+              <a:ahLst/>
+              <a:cxnLst/>
+              <a:rect l="l" t="t" r="r" b="b"/>
+              <a:pathLst>
+                <a:path w="1249825" h="6858000">
+                  <a:moveTo>
+                    <a:pt x="0" y="0"/>
+                  </a:moveTo>
+                  <a:lnTo>
+                    <a:pt x="1249825" y="0"/>
+                  </a:lnTo>
+                  <a:lnTo>
+                    <a:pt x="1249825" y="6858000"/>
+                  </a:lnTo>
+                  <a:lnTo>
+                    <a:pt x="1109382" y="6858000"/>
+                  </a:lnTo>
+                  <a:lnTo>
+                    <a:pt x="0" y="0"/>
+                  </a:lnTo>
+                  <a:close/>
+                </a:path>
+              </a:pathLst>
+            </a:custGeom>
+            <a:solidFill>
+              <a:schemeClr val="accent2">
+                <a:lumMod val="75000"/>
+                <a:alpha val="80000"/>
+              </a:schemeClr>
+            </a:solidFill>
+            <a:ln>
+              <a:noFill/>
+            </a:ln>
+            <a:effectLst/>
+          </p:spPr>
+          <p:style>
+            <a:lnRef idx="1">
+              <a:schemeClr val="accent1"/>
+            </a:lnRef>
+            <a:fillRef idx="3">
+              <a:schemeClr val="accent1"/>
+            </a:fillRef>
+            <a:effectRef idx="2">
+              <a:schemeClr val="accent1"/>
+            </a:effectRef>
+            <a:fontRef idx="minor">
+              <a:schemeClr val="lt1"/>
+            </a:fontRef>
+          </p:style>
+        </p:sp>
+        <p:sp>
+          <p:nvSpPr>
+            <p:cNvPr id="34" name="Isosceles Triangle 33">
+              <a:extLst>
+                <a:ext uri="{FF2B5EF4-FFF2-40B4-BE49-F238E27FC236}">
+                  <a16:creationId xmlns:a16="http://schemas.microsoft.com/office/drawing/2014/main" id="{0AF7217B-D042-44D2-9FC7-71FAB6651A47}"/>
+                </a:ext>
+                <a:ext uri="{C183D7F6-B498-43B3-948B-1728B52AA6E4}">
+                  <adec:decorative xmlns:adec="http://schemas.microsoft.com/office/drawing/2017/decorative" val="1"/>
+                </a:ext>
+              </a:extLst>
+            </p:cNvPr>
+            <p:cNvSpPr/>
+            <p:nvPr>
+              <p:extLst>
+                <p:ext uri="{386F3935-93C4-4BCD-93E2-E3B085C9AB24}">
+                  <p16:designElem xmlns:p16="http://schemas.microsoft.com/office/powerpoint/2015/main" val="1"/>
+                </p:ext>
+              </p:extLst>
+            </p:nvPr>
+          </p:nvSpPr>
+          <p:spPr>
+            <a:xfrm>
+              <a:off x="10371666" y="3589867"/>
+              <a:ext cx="1817159" cy="3268133"/>
+            </a:xfrm>
+            <a:prstGeom prst="triangle">
+              <a:avLst>
+                <a:gd name="adj" fmla="val 100000"/>
+              </a:avLst>
+            </a:prstGeom>
+            <a:solidFill>
+              <a:schemeClr val="accent1">
+                <a:lumMod val="75000"/>
+                <a:alpha val="66000"/>
+              </a:schemeClr>
+            </a:solidFill>
+            <a:ln>
+              <a:noFill/>
+            </a:ln>
+            <a:effectLst/>
+          </p:spPr>
+          <p:style>
+            <a:lnRef idx="1">
+              <a:schemeClr val="accent1"/>
+            </a:lnRef>
+            <a:fillRef idx="3">
+              <a:schemeClr val="accent1"/>
+            </a:fillRef>
+            <a:effectRef idx="2">
+              <a:schemeClr val="accent1"/>
+            </a:effectRef>
+            <a:fontRef idx="minor">
+              <a:schemeClr val="lt1"/>
+            </a:fontRef>
+          </p:style>
+        </p:sp>
+        <p:sp>
+          <p:nvSpPr>
+            <p:cNvPr id="35" name="Isosceles Triangle 34">
+              <a:extLst>
+                <a:ext uri="{FF2B5EF4-FFF2-40B4-BE49-F238E27FC236}">
+                  <a16:creationId xmlns:a16="http://schemas.microsoft.com/office/drawing/2014/main" id="{1CC9171B-8BEB-48B1-B9BE-E9584522D074}"/>
+                </a:ext>
+                <a:ext uri="{C183D7F6-B498-43B3-948B-1728B52AA6E4}">
+                  <adec:decorative xmlns:adec="http://schemas.microsoft.com/office/drawing/2017/decorative" val="1"/>
+                </a:ext>
+              </a:extLst>
+            </p:cNvPr>
+            <p:cNvSpPr/>
+            <p:nvPr>
+              <p:extLst>
+                <p:ext uri="{386F3935-93C4-4BCD-93E2-E3B085C9AB24}">
+                  <p16:designElem xmlns:p16="http://schemas.microsoft.com/office/powerpoint/2015/main" val="1"/>
+                </p:ext>
+              </p:extLst>
+            </p:nvPr>
+          </p:nvSpPr>
+          <p:spPr>
+            <a:xfrm>
+              <a:off x="0" y="4013200"/>
+              <a:ext cx="448733" cy="2844800"/>
+            </a:xfrm>
+            <a:prstGeom prst="triangle">
+              <a:avLst>
+                <a:gd name="adj" fmla="val 0"/>
+              </a:avLst>
+            </a:prstGeom>
+            <a:solidFill>
+              <a:schemeClr val="accent1">
+                <a:alpha val="70000"/>
+              </a:schemeClr>
+            </a:solidFill>
+            <a:ln>
+              <a:noFill/>
+            </a:ln>
+            <a:effectLst/>
+          </p:spPr>
+          <p:style>
+            <a:lnRef idx="1">
+              <a:schemeClr val="accent1"/>
+            </a:lnRef>
+            <a:fillRef idx="3">
+              <a:schemeClr val="accent1"/>
+            </a:fillRef>
+            <a:effectRef idx="2">
+              <a:schemeClr val="accent1"/>
+            </a:effectRef>
+            <a:fontRef idx="minor">
+              <a:schemeClr val="lt1"/>
+            </a:fontRef>
+          </p:style>
+        </p:sp>
+      </p:grpSp>
+      <p:pic>
+        <p:nvPicPr>
+          <p:cNvPr id="5" name="Content Placeholder 4" descr="A screenshot of a cell phone&#10;&#10;Description automatically generated">
+            <a:extLst>
+              <a:ext uri="{FF2B5EF4-FFF2-40B4-BE49-F238E27FC236}">
+                <a16:creationId xmlns:a16="http://schemas.microsoft.com/office/drawing/2014/main" id="{24668495-4AAA-428C-87B6-956F6EE7D757}"/>
+              </a:ext>
+            </a:extLst>
+          </p:cNvPr>
+          <p:cNvPicPr>
+            <a:picLocks noGrp="1" noChangeAspect="1"/>
+          </p:cNvPicPr>
+          <p:nvPr>
+            <p:ph idx="1"/>
+          </p:nvPr>
+        </p:nvPicPr>
+        <p:blipFill rotWithShape="1">
+          <a:blip r:embed="rId2"/>
+          <a:srcRect b="48692"/>
+          <a:stretch/>
+        </p:blipFill>
+        <p:spPr>
+          <a:xfrm>
+            <a:off x="638126" y="2040113"/>
+            <a:ext cx="7478946" cy="2657328"/>
+          </a:xfrm>
+          <a:prstGeom prst="rect">
+            <a:avLst/>
+          </a:prstGeom>
+        </p:spPr>
+      </p:pic>
+    </p:spTree>
+    <p:extLst>
+      <p:ext uri="{BB962C8B-B14F-4D97-AF65-F5344CB8AC3E}">
+        <p14:creationId xmlns:p14="http://schemas.microsoft.com/office/powerpoint/2010/main" val="1100453777"/>
+      </p:ext>
+    </p:extLst>
+  </p:cSld>
+  <p:clrMapOvr>
+    <a:masterClrMapping/>
+  </p:clrMapOvr>
+</p:sld>
+</file>
+
+<file path=ppt/slides/slide12.xml><?xml version="1.0" encoding="utf-8"?>
+<p:sld xmlns:a="http://schemas.openxmlformats.org/drawingml/2006/main" xmlns:r="http://schemas.openxmlformats.org/officeDocument/2006/relationships" xmlns:p="http://schemas.openxmlformats.org/presentationml/2006/main">
+  <p:cSld>
+    <p:bg>
+      <p:bgPr>
+        <a:solidFill>
+          <a:schemeClr val="bg1"/>
+        </a:solidFill>
+        <a:effectLst/>
+      </p:bgPr>
+    </p:bg>
+    <p:spTree>
+      <p:nvGrpSpPr>
+        <p:cNvPr id="1" name=""/>
+        <p:cNvGrpSpPr/>
+        <p:nvPr/>
+      </p:nvGrpSpPr>
+      <p:grpSpPr>
+        <a:xfrm>
+          <a:off x="0" y="0"/>
+          <a:ext cx="0" cy="0"/>
+          <a:chOff x="0" y="0"/>
+          <a:chExt cx="0" cy="0"/>
+        </a:xfrm>
+      </p:grpSpPr>
+      <p:grpSp>
+        <p:nvGrpSpPr>
+          <p:cNvPr id="10" name="Group 9">
+            <a:extLst>
+              <a:ext uri="{FF2B5EF4-FFF2-40B4-BE49-F238E27FC236}">
+                <a16:creationId xmlns:a16="http://schemas.microsoft.com/office/drawing/2014/main" id="{4815A7B4-532E-48C9-AC24-D78ACF3339DB}"/>
+              </a:ext>
+              <a:ext uri="{C183D7F6-B498-43B3-948B-1728B52AA6E4}">
+                <adec:decorative xmlns:adec="http://schemas.microsoft.com/office/drawing/2017/decorative" val="1"/>
+              </a:ext>
+            </a:extLst>
+          </p:cNvPr>
+          <p:cNvGrpSpPr>
+            <a:grpSpLocks noGrp="1" noUngrp="1" noRot="1" noChangeAspect="1" noMove="1" noResize="1"/>
+          </p:cNvGrpSpPr>
+          <p:nvPr>
+            <p:extLst>
+              <p:ext uri="{386F3935-93C4-4BCD-93E2-E3B085C9AB24}">
+                <p16:designElem xmlns:p16="http://schemas.microsoft.com/office/powerpoint/2015/main" val="1"/>
+              </p:ext>
+            </p:extLst>
+          </p:nvPr>
+        </p:nvGrpSpPr>
+        <p:grpSpPr>
+          <a:xfrm>
+            <a:off x="0" y="-8467"/>
+            <a:ext cx="12192000" cy="6866467"/>
+            <a:chOff x="0" y="-8467"/>
+            <a:chExt cx="12192000" cy="6866467"/>
+          </a:xfrm>
+        </p:grpSpPr>
+        <p:sp>
+          <p:nvSpPr>
+            <p:cNvPr id="11" name="Freeform 14">
+              <a:extLst>
+                <a:ext uri="{FF2B5EF4-FFF2-40B4-BE49-F238E27FC236}">
+                  <a16:creationId xmlns:a16="http://schemas.microsoft.com/office/drawing/2014/main" id="{D40109F4-CE5C-45F4-856E-F3F69C9FD4E1}"/>
+                </a:ext>
+                <a:ext uri="{C183D7F6-B498-43B3-948B-1728B52AA6E4}">
+                  <adec:decorative xmlns:adec="http://schemas.microsoft.com/office/drawing/2017/decorative" val="1"/>
+                </a:ext>
+              </a:extLst>
+            </p:cNvPr>
+            <p:cNvSpPr/>
+            <p:nvPr>
+              <p:extLst>
+                <p:ext uri="{386F3935-93C4-4BCD-93E2-E3B085C9AB24}">
+                  <p16:designElem xmlns:p16="http://schemas.microsoft.com/office/powerpoint/2015/main" val="1"/>
+                </p:ext>
+              </p:extLst>
+            </p:nvPr>
+          </p:nvSpPr>
+          <p:spPr>
+            <a:xfrm>
+              <a:off x="0" y="-7862"/>
+              <a:ext cx="863600" cy="5698067"/>
+            </a:xfrm>
+            <a:custGeom>
+              <a:avLst/>
+              <a:gdLst/>
+              <a:ahLst/>
+              <a:cxnLst/>
+              <a:rect l="l" t="t" r="r" b="b"/>
+              <a:pathLst>
+                <a:path w="863600" h="5698067">
+                  <a:moveTo>
+                    <a:pt x="0" y="8467"/>
+                  </a:moveTo>
+                  <a:lnTo>
+                    <a:pt x="863600" y="0"/>
+                  </a:lnTo>
+                  <a:lnTo>
+                    <a:pt x="863600" y="16934"/>
+                  </a:lnTo>
+                  <a:lnTo>
+                    <a:pt x="0" y="5698067"/>
+                  </a:lnTo>
+                  <a:lnTo>
+                    <a:pt x="0" y="8467"/>
+                  </a:lnTo>
+                  <a:close/>
+                </a:path>
+              </a:pathLst>
+            </a:custGeom>
+            <a:solidFill>
+              <a:schemeClr val="accent1">
+                <a:alpha val="70000"/>
+              </a:schemeClr>
+            </a:solidFill>
+            <a:ln>
+              <a:noFill/>
+            </a:ln>
+            <a:effectLst/>
+          </p:spPr>
+          <p:style>
+            <a:lnRef idx="1">
+              <a:schemeClr val="accent1"/>
+            </a:lnRef>
+            <a:fillRef idx="3">
+              <a:schemeClr val="accent1"/>
+            </a:fillRef>
+            <a:effectRef idx="2">
+              <a:schemeClr val="accent1"/>
+            </a:effectRef>
+            <a:fontRef idx="minor">
+              <a:schemeClr val="lt1"/>
+            </a:fontRef>
+          </p:style>
+        </p:sp>
+        <p:cxnSp>
+          <p:nvCxnSpPr>
+            <p:cNvPr id="12" name="Straight Connector 11">
+              <a:extLst>
+                <a:ext uri="{FF2B5EF4-FFF2-40B4-BE49-F238E27FC236}">
+                  <a16:creationId xmlns:a16="http://schemas.microsoft.com/office/drawing/2014/main" id="{3CBAA4DE-3D7B-460B-AE98-D9F9990C0B62}"/>
+                </a:ext>
+                <a:ext uri="{C183D7F6-B498-43B3-948B-1728B52AA6E4}">
+                  <adec:decorative xmlns:adec="http://schemas.microsoft.com/office/drawing/2017/decorative" val="1"/>
+                </a:ext>
+              </a:extLst>
+            </p:cNvPr>
+            <p:cNvCxnSpPr/>
+            <p:nvPr>
+              <p:extLst>
+                <p:ext uri="{386F3935-93C4-4BCD-93E2-E3B085C9AB24}">
+                  <p16:designElem xmlns:p16="http://schemas.microsoft.com/office/powerpoint/2015/main" val="1"/>
+                </p:ext>
+              </p:extLst>
+            </p:nvPr>
+          </p:nvCxnSpPr>
+          <p:spPr>
+            <a:xfrm>
+              <a:off x="9371012" y="0"/>
+              <a:ext cx="1219200" cy="6858000"/>
+            </a:xfrm>
+            <a:prstGeom prst="line">
+              <a:avLst/>
+            </a:prstGeom>
+            <a:ln w="9525">
+              <a:solidFill>
+                <a:schemeClr val="accent1">
+                  <a:alpha val="70000"/>
+                </a:schemeClr>
+              </a:solidFill>
+            </a:ln>
+          </p:spPr>
+          <p:style>
+            <a:lnRef idx="2">
+              <a:schemeClr val="accent1"/>
+            </a:lnRef>
+            <a:fillRef idx="0">
+              <a:schemeClr val="accent1"/>
+            </a:fillRef>
+            <a:effectRef idx="1">
+              <a:schemeClr val="accent1"/>
+            </a:effectRef>
+            <a:fontRef idx="minor">
+              <a:schemeClr val="tx1"/>
+            </a:fontRef>
+          </p:style>
+        </p:cxnSp>
+        <p:cxnSp>
+          <p:nvCxnSpPr>
+            <p:cNvPr id="13" name="Straight Connector 12">
+              <a:extLst>
+                <a:ext uri="{FF2B5EF4-FFF2-40B4-BE49-F238E27FC236}">
+                  <a16:creationId xmlns:a16="http://schemas.microsoft.com/office/drawing/2014/main" id="{7BF1ED3E-4F80-4AF6-A41B-44F53DDE610D}"/>
+                </a:ext>
+                <a:ext uri="{C183D7F6-B498-43B3-948B-1728B52AA6E4}">
+                  <adec:decorative xmlns:adec="http://schemas.microsoft.com/office/drawing/2017/decorative" val="1"/>
+                </a:ext>
+              </a:extLst>
+            </p:cNvPr>
+            <p:cNvCxnSpPr/>
+            <p:nvPr>
+              <p:extLst>
+                <p:ext uri="{386F3935-93C4-4BCD-93E2-E3B085C9AB24}">
+                  <p16:designElem xmlns:p16="http://schemas.microsoft.com/office/powerpoint/2015/main" val="1"/>
+                </p:ext>
+              </p:extLst>
+            </p:nvPr>
+          </p:nvCxnSpPr>
+          <p:spPr>
+            <a:xfrm flipH="1">
+              <a:off x="7425267" y="3681413"/>
+              <a:ext cx="4763558" cy="3176587"/>
+            </a:xfrm>
+            <a:prstGeom prst="line">
+              <a:avLst/>
+            </a:prstGeom>
+            <a:ln w="9525">
+              <a:solidFill>
+                <a:schemeClr val="accent1">
+                  <a:alpha val="70000"/>
+                </a:schemeClr>
+              </a:solidFill>
+            </a:ln>
+          </p:spPr>
+          <p:style>
+            <a:lnRef idx="2">
+              <a:schemeClr val="accent1"/>
+            </a:lnRef>
+            <a:fillRef idx="0">
+              <a:schemeClr val="accent1"/>
+            </a:fillRef>
+            <a:effectRef idx="1">
+              <a:schemeClr val="accent1"/>
+            </a:effectRef>
+            <a:fontRef idx="minor">
+              <a:schemeClr val="tx1"/>
+            </a:fontRef>
+          </p:style>
+        </p:cxnSp>
+        <p:sp>
+          <p:nvSpPr>
+            <p:cNvPr id="14" name="Rectangle 23">
+              <a:extLst>
+                <a:ext uri="{FF2B5EF4-FFF2-40B4-BE49-F238E27FC236}">
+                  <a16:creationId xmlns:a16="http://schemas.microsoft.com/office/drawing/2014/main" id="{C0B2D747-3E31-45C5-9A98-A9710A585FBB}"/>
+                </a:ext>
+                <a:ext uri="{C183D7F6-B498-43B3-948B-1728B52AA6E4}">
+                  <adec:decorative xmlns:adec="http://schemas.microsoft.com/office/drawing/2017/decorative" val="1"/>
+                </a:ext>
+              </a:extLst>
+            </p:cNvPr>
+            <p:cNvSpPr/>
+            <p:nvPr>
+              <p:extLst>
+                <p:ext uri="{386F3935-93C4-4BCD-93E2-E3B085C9AB24}">
+                  <p16:designElem xmlns:p16="http://schemas.microsoft.com/office/powerpoint/2015/main" val="1"/>
+                </p:ext>
+              </p:extLst>
+            </p:nvPr>
+          </p:nvSpPr>
+          <p:spPr>
+            <a:xfrm>
+              <a:off x="9181476" y="-8467"/>
+              <a:ext cx="3007349" cy="6866467"/>
+            </a:xfrm>
+            <a:custGeom>
+              <a:avLst/>
+              <a:gdLst/>
+              <a:ahLst/>
+              <a:cxnLst/>
+              <a:rect l="l" t="t" r="r" b="b"/>
+              <a:pathLst>
+                <a:path w="3007349" h="6866467">
+                  <a:moveTo>
+                    <a:pt x="2045532" y="0"/>
+                  </a:moveTo>
+                  <a:lnTo>
+                    <a:pt x="3007349" y="0"/>
+                  </a:lnTo>
+                  <a:lnTo>
+                    <a:pt x="3007349" y="6866467"/>
+                  </a:lnTo>
+                  <a:lnTo>
+                    <a:pt x="0" y="6866467"/>
+                  </a:lnTo>
+                  <a:lnTo>
+                    <a:pt x="2045532" y="0"/>
+                  </a:lnTo>
+                  <a:close/>
+                </a:path>
+              </a:pathLst>
+            </a:custGeom>
+            <a:solidFill>
+              <a:schemeClr val="accent1">
+                <a:alpha val="36000"/>
+              </a:schemeClr>
+            </a:solidFill>
+            <a:ln>
+              <a:noFill/>
+            </a:ln>
+            <a:effectLst/>
+          </p:spPr>
+          <p:style>
+            <a:lnRef idx="1">
+              <a:schemeClr val="accent1"/>
+            </a:lnRef>
+            <a:fillRef idx="3">
+              <a:schemeClr val="accent1"/>
+            </a:fillRef>
+            <a:effectRef idx="2">
+              <a:schemeClr val="accent1"/>
+            </a:effectRef>
+            <a:fontRef idx="minor">
+              <a:schemeClr val="lt1"/>
+            </a:fontRef>
+          </p:style>
+        </p:sp>
+        <p:sp>
+          <p:nvSpPr>
+            <p:cNvPr id="15" name="Rectangle 25">
+              <a:extLst>
+                <a:ext uri="{FF2B5EF4-FFF2-40B4-BE49-F238E27FC236}">
+                  <a16:creationId xmlns:a16="http://schemas.microsoft.com/office/drawing/2014/main" id="{A15FD4BA-3020-462D-8BE8-B3A65B8E492A}"/>
+                </a:ext>
+                <a:ext uri="{C183D7F6-B498-43B3-948B-1728B52AA6E4}">
+                  <adec:decorative xmlns:adec="http://schemas.microsoft.com/office/drawing/2017/decorative" val="1"/>
+                </a:ext>
+              </a:extLst>
+            </p:cNvPr>
+            <p:cNvSpPr/>
+            <p:nvPr>
+              <p:extLst>
+                <p:ext uri="{386F3935-93C4-4BCD-93E2-E3B085C9AB24}">
+                  <p16:designElem xmlns:p16="http://schemas.microsoft.com/office/powerpoint/2015/main" val="1"/>
+                </p:ext>
+              </p:extLst>
+            </p:nvPr>
+          </p:nvSpPr>
+          <p:spPr>
+            <a:xfrm>
+              <a:off x="9603442" y="-8467"/>
+              <a:ext cx="2588558" cy="6866467"/>
+            </a:xfrm>
+            <a:custGeom>
+              <a:avLst/>
+              <a:gdLst/>
+              <a:ahLst/>
+              <a:cxnLst/>
+              <a:rect l="l" t="t" r="r" b="b"/>
+              <a:pathLst>
+                <a:path w="2573311" h="6866467">
+                  <a:moveTo>
+                    <a:pt x="0" y="0"/>
+                  </a:moveTo>
+                  <a:lnTo>
+                    <a:pt x="2573311" y="0"/>
+                  </a:lnTo>
+                  <a:lnTo>
+                    <a:pt x="2573311" y="6866467"/>
+                  </a:lnTo>
+                  <a:lnTo>
+                    <a:pt x="1202336" y="6866467"/>
+                  </a:lnTo>
+                  <a:lnTo>
+                    <a:pt x="0" y="0"/>
+                  </a:lnTo>
+                  <a:close/>
+                </a:path>
+              </a:pathLst>
+            </a:custGeom>
+            <a:solidFill>
+              <a:schemeClr val="accent1">
+                <a:alpha val="20000"/>
+              </a:schemeClr>
+            </a:solidFill>
+            <a:ln>
+              <a:noFill/>
+            </a:ln>
+            <a:effectLst/>
+          </p:spPr>
+          <p:style>
+            <a:lnRef idx="1">
+              <a:schemeClr val="accent1"/>
+            </a:lnRef>
+            <a:fillRef idx="3">
+              <a:schemeClr val="accent1"/>
+            </a:fillRef>
+            <a:effectRef idx="2">
+              <a:schemeClr val="accent1"/>
+            </a:effectRef>
+            <a:fontRef idx="minor">
+              <a:schemeClr val="lt1"/>
+            </a:fontRef>
+          </p:style>
+        </p:sp>
+        <p:sp>
+          <p:nvSpPr>
+            <p:cNvPr id="16" name="Isosceles Triangle 15">
+              <a:extLst>
+                <a:ext uri="{FF2B5EF4-FFF2-40B4-BE49-F238E27FC236}">
+                  <a16:creationId xmlns:a16="http://schemas.microsoft.com/office/drawing/2014/main" id="{A304284A-7318-4DD5-898C-2F6B23C778FA}"/>
+                </a:ext>
+                <a:ext uri="{C183D7F6-B498-43B3-948B-1728B52AA6E4}">
+                  <adec:decorative xmlns:adec="http://schemas.microsoft.com/office/drawing/2017/decorative" val="1"/>
+                </a:ext>
+              </a:extLst>
+            </p:cNvPr>
+            <p:cNvSpPr/>
+            <p:nvPr>
+              <p:extLst>
+                <p:ext uri="{386F3935-93C4-4BCD-93E2-E3B085C9AB24}">
+                  <p16:designElem xmlns:p16="http://schemas.microsoft.com/office/powerpoint/2015/main" val="1"/>
+                </p:ext>
+              </p:extLst>
+            </p:nvPr>
+          </p:nvSpPr>
+          <p:spPr>
+            <a:xfrm>
+              <a:off x="8932333" y="3048000"/>
+              <a:ext cx="3259667" cy="3810000"/>
+            </a:xfrm>
+            <a:prstGeom prst="triangle">
+              <a:avLst>
+                <a:gd name="adj" fmla="val 100000"/>
+              </a:avLst>
+            </a:prstGeom>
+            <a:solidFill>
+              <a:schemeClr val="accent1">
+                <a:lumMod val="75000"/>
+                <a:alpha val="66000"/>
+              </a:schemeClr>
+            </a:solidFill>
+            <a:ln>
+              <a:noFill/>
+            </a:ln>
+            <a:effectLst/>
+          </p:spPr>
+          <p:style>
+            <a:lnRef idx="1">
+              <a:schemeClr val="accent1"/>
+            </a:lnRef>
+            <a:fillRef idx="3">
+              <a:schemeClr val="accent1"/>
+            </a:fillRef>
+            <a:effectRef idx="2">
+              <a:schemeClr val="accent1"/>
+            </a:effectRef>
+            <a:fontRef idx="minor">
+              <a:schemeClr val="lt1"/>
+            </a:fontRef>
+          </p:style>
+        </p:sp>
+        <p:sp>
+          <p:nvSpPr>
+            <p:cNvPr id="17" name="Rectangle 27">
+              <a:extLst>
+                <a:ext uri="{FF2B5EF4-FFF2-40B4-BE49-F238E27FC236}">
+                  <a16:creationId xmlns:a16="http://schemas.microsoft.com/office/drawing/2014/main" id="{9DF48E66-B635-4509-B115-E0987C014EBC}"/>
+                </a:ext>
+                <a:ext uri="{C183D7F6-B498-43B3-948B-1728B52AA6E4}">
+                  <adec:decorative xmlns:adec="http://schemas.microsoft.com/office/drawing/2017/decorative" val="1"/>
+                </a:ext>
+              </a:extLst>
+            </p:cNvPr>
+            <p:cNvSpPr/>
+            <p:nvPr>
+              <p:extLst>
+                <p:ext uri="{386F3935-93C4-4BCD-93E2-E3B085C9AB24}">
+                  <p16:designElem xmlns:p16="http://schemas.microsoft.com/office/powerpoint/2015/main" val="1"/>
+                </p:ext>
+              </p:extLst>
+            </p:nvPr>
+          </p:nvSpPr>
+          <p:spPr>
+            <a:xfrm>
+              <a:off x="9334500" y="-8467"/>
+              <a:ext cx="2854326" cy="6866467"/>
+            </a:xfrm>
+            <a:custGeom>
+              <a:avLst/>
+              <a:gdLst/>
+              <a:ahLst/>
+              <a:cxnLst/>
+              <a:rect l="l" t="t" r="r" b="b"/>
+              <a:pathLst>
+                <a:path w="2858013" h="6866467">
+                  <a:moveTo>
+                    <a:pt x="0" y="0"/>
+                  </a:moveTo>
+                  <a:lnTo>
+                    <a:pt x="2858013" y="0"/>
+                  </a:lnTo>
+                  <a:lnTo>
+                    <a:pt x="2858013" y="6866467"/>
+                  </a:lnTo>
+                  <a:lnTo>
+                    <a:pt x="2473942" y="6866467"/>
+                  </a:lnTo>
+                  <a:lnTo>
+                    <a:pt x="0" y="0"/>
+                  </a:lnTo>
+                  <a:close/>
+                </a:path>
+              </a:pathLst>
+            </a:custGeom>
+            <a:solidFill>
+              <a:schemeClr val="accent1">
+                <a:lumMod val="75000"/>
+                <a:alpha val="50000"/>
+              </a:schemeClr>
+            </a:solidFill>
+            <a:ln>
+              <a:noFill/>
+            </a:ln>
+            <a:effectLst/>
+          </p:spPr>
+          <p:style>
+            <a:lnRef idx="1">
+              <a:schemeClr val="accent1"/>
+            </a:lnRef>
+            <a:fillRef idx="3">
+              <a:schemeClr val="accent1"/>
+            </a:fillRef>
+            <a:effectRef idx="2">
+              <a:schemeClr val="accent1"/>
+            </a:effectRef>
+            <a:fontRef idx="minor">
+              <a:schemeClr val="lt1"/>
+            </a:fontRef>
+          </p:style>
+        </p:sp>
+        <p:sp>
+          <p:nvSpPr>
+            <p:cNvPr id="18" name="Rectangle 28">
+              <a:extLst>
+                <a:ext uri="{FF2B5EF4-FFF2-40B4-BE49-F238E27FC236}">
+                  <a16:creationId xmlns:a16="http://schemas.microsoft.com/office/drawing/2014/main" id="{E3B96D94-5F5A-4F4C-810C-917BF4D266C3}"/>
+                </a:ext>
+                <a:ext uri="{C183D7F6-B498-43B3-948B-1728B52AA6E4}">
+                  <adec:decorative xmlns:adec="http://schemas.microsoft.com/office/drawing/2017/decorative" val="1"/>
+                </a:ext>
+              </a:extLst>
+            </p:cNvPr>
+            <p:cNvSpPr/>
+            <p:nvPr>
+              <p:extLst>
+                <p:ext uri="{386F3935-93C4-4BCD-93E2-E3B085C9AB24}">
+                  <p16:designElem xmlns:p16="http://schemas.microsoft.com/office/powerpoint/2015/main" val="1"/>
+                </p:ext>
+              </p:extLst>
+            </p:nvPr>
+          </p:nvSpPr>
+          <p:spPr>
+            <a:xfrm>
+              <a:off x="10898730" y="-8467"/>
+              <a:ext cx="1290094" cy="6866467"/>
+            </a:xfrm>
+            <a:custGeom>
+              <a:avLst/>
+              <a:gdLst/>
+              <a:ahLst/>
+              <a:cxnLst/>
+              <a:rect l="l" t="t" r="r" b="b"/>
+              <a:pathLst>
+                <a:path w="1290094" h="6858000">
+                  <a:moveTo>
+                    <a:pt x="1019735" y="0"/>
+                  </a:moveTo>
+                  <a:lnTo>
+                    <a:pt x="1290094" y="0"/>
+                  </a:lnTo>
+                  <a:lnTo>
+                    <a:pt x="1290094" y="6858000"/>
+                  </a:lnTo>
+                  <a:lnTo>
+                    <a:pt x="0" y="6858000"/>
+                  </a:lnTo>
+                  <a:lnTo>
+                    <a:pt x="1019735" y="0"/>
+                  </a:lnTo>
+                  <a:close/>
+                </a:path>
+              </a:pathLst>
+            </a:custGeom>
+            <a:solidFill>
+              <a:schemeClr val="accent2">
+                <a:alpha val="70000"/>
+              </a:schemeClr>
+            </a:solidFill>
+            <a:ln>
+              <a:noFill/>
+            </a:ln>
+            <a:effectLst/>
+          </p:spPr>
+          <p:style>
+            <a:lnRef idx="1">
+              <a:schemeClr val="accent1"/>
+            </a:lnRef>
+            <a:fillRef idx="3">
+              <a:schemeClr val="accent1"/>
+            </a:fillRef>
+            <a:effectRef idx="2">
+              <a:schemeClr val="accent1"/>
+            </a:effectRef>
+            <a:fontRef idx="minor">
+              <a:schemeClr val="lt1"/>
+            </a:fontRef>
+          </p:style>
+        </p:sp>
+        <p:sp>
+          <p:nvSpPr>
+            <p:cNvPr id="19" name="Rectangle 29">
+              <a:extLst>
+                <a:ext uri="{FF2B5EF4-FFF2-40B4-BE49-F238E27FC236}">
+                  <a16:creationId xmlns:a16="http://schemas.microsoft.com/office/drawing/2014/main" id="{7F3782D6-BFF8-4389-9D39-A023ADAA92C1}"/>
+                </a:ext>
+                <a:ext uri="{C183D7F6-B498-43B3-948B-1728B52AA6E4}">
+                  <adec:decorative xmlns:adec="http://schemas.microsoft.com/office/drawing/2017/decorative" val="1"/>
+                </a:ext>
+              </a:extLst>
+            </p:cNvPr>
+            <p:cNvSpPr/>
+            <p:nvPr>
+              <p:extLst>
+                <p:ext uri="{386F3935-93C4-4BCD-93E2-E3B085C9AB24}">
+                  <p16:designElem xmlns:p16="http://schemas.microsoft.com/office/powerpoint/2015/main" val="1"/>
+                </p:ext>
+              </p:extLst>
+            </p:nvPr>
+          </p:nvSpPr>
+          <p:spPr>
+            <a:xfrm>
+              <a:off x="10938999" y="-8467"/>
+              <a:ext cx="1249825" cy="6866467"/>
+            </a:xfrm>
+            <a:custGeom>
+              <a:avLst/>
+              <a:gdLst/>
+              <a:ahLst/>
+              <a:cxnLst/>
+              <a:rect l="l" t="t" r="r" b="b"/>
+              <a:pathLst>
+                <a:path w="1249825" h="6858000">
+                  <a:moveTo>
+                    <a:pt x="0" y="0"/>
+                  </a:moveTo>
+                  <a:lnTo>
+                    <a:pt x="1249825" y="0"/>
+                  </a:lnTo>
+                  <a:lnTo>
+                    <a:pt x="1249825" y="6858000"/>
+                  </a:lnTo>
+                  <a:lnTo>
+                    <a:pt x="1109382" y="6858000"/>
+                  </a:lnTo>
+                  <a:lnTo>
+                    <a:pt x="0" y="0"/>
+                  </a:lnTo>
+                  <a:close/>
+                </a:path>
+              </a:pathLst>
+            </a:custGeom>
+            <a:solidFill>
+              <a:schemeClr val="accent2">
+                <a:lumMod val="75000"/>
+                <a:alpha val="80000"/>
+              </a:schemeClr>
+            </a:solidFill>
+            <a:ln>
+              <a:noFill/>
+            </a:ln>
+            <a:effectLst/>
+          </p:spPr>
+          <p:style>
+            <a:lnRef idx="1">
+              <a:schemeClr val="accent1"/>
+            </a:lnRef>
+            <a:fillRef idx="3">
+              <a:schemeClr val="accent1"/>
+            </a:fillRef>
+            <a:effectRef idx="2">
+              <a:schemeClr val="accent1"/>
+            </a:effectRef>
+            <a:fontRef idx="minor">
+              <a:schemeClr val="lt1"/>
+            </a:fontRef>
+          </p:style>
+        </p:sp>
+        <p:sp>
+          <p:nvSpPr>
+            <p:cNvPr id="20" name="Isosceles Triangle 19">
+              <a:extLst>
+                <a:ext uri="{FF2B5EF4-FFF2-40B4-BE49-F238E27FC236}">
+                  <a16:creationId xmlns:a16="http://schemas.microsoft.com/office/drawing/2014/main" id="{ECE162D4-FCAE-441B-B5E9-C91DE62124EF}"/>
+                </a:ext>
+                <a:ext uri="{C183D7F6-B498-43B3-948B-1728B52AA6E4}">
+                  <adec:decorative xmlns:adec="http://schemas.microsoft.com/office/drawing/2017/decorative" val="1"/>
+                </a:ext>
+              </a:extLst>
+            </p:cNvPr>
+            <p:cNvSpPr/>
+            <p:nvPr>
+              <p:extLst>
+                <p:ext uri="{386F3935-93C4-4BCD-93E2-E3B085C9AB24}">
+                  <p16:designElem xmlns:p16="http://schemas.microsoft.com/office/powerpoint/2015/main" val="1"/>
+                </p:ext>
+              </p:extLst>
+            </p:nvPr>
+          </p:nvSpPr>
+          <p:spPr>
+            <a:xfrm>
+              <a:off x="10371666" y="3589867"/>
+              <a:ext cx="1817159" cy="3268133"/>
+            </a:xfrm>
+            <a:prstGeom prst="triangle">
+              <a:avLst>
+                <a:gd name="adj" fmla="val 100000"/>
+              </a:avLst>
+            </a:prstGeom>
+            <a:solidFill>
+              <a:schemeClr val="accent1">
+                <a:lumMod val="75000"/>
+                <a:alpha val="66000"/>
+              </a:schemeClr>
+            </a:solidFill>
+            <a:ln>
+              <a:noFill/>
+            </a:ln>
+            <a:effectLst/>
+          </p:spPr>
+          <p:style>
+            <a:lnRef idx="1">
+              <a:schemeClr val="accent1"/>
+            </a:lnRef>
+            <a:fillRef idx="3">
+              <a:schemeClr val="accent1"/>
+            </a:fillRef>
+            <a:effectRef idx="2">
+              <a:schemeClr val="accent1"/>
+            </a:effectRef>
+            <a:fontRef idx="minor">
+              <a:schemeClr val="lt1"/>
+            </a:fontRef>
+          </p:style>
+        </p:sp>
+      </p:grpSp>
+      <p:sp>
+        <p:nvSpPr>
+          <p:cNvPr id="2" name="Title 1">
+            <a:extLst>
+              <a:ext uri="{FF2B5EF4-FFF2-40B4-BE49-F238E27FC236}">
+                <a16:creationId xmlns:a16="http://schemas.microsoft.com/office/drawing/2014/main" id="{02571633-4D57-46C0-A431-D6305670E635}"/>
+              </a:ext>
+            </a:extLst>
+          </p:cNvPr>
+          <p:cNvSpPr>
+            <a:spLocks noGrp="1"/>
+          </p:cNvSpPr>
+          <p:nvPr>
+            <p:ph type="title"/>
+          </p:nvPr>
+        </p:nvSpPr>
+        <p:spPr>
+          <a:xfrm>
+            <a:off x="985969" y="4553712"/>
+            <a:ext cx="8288032" cy="1096316"/>
+          </a:xfrm>
+        </p:spPr>
+        <p:txBody>
+          <a:bodyPr vert="horz" lIns="91440" tIns="45720" rIns="91440" bIns="45720" rtlCol="0" anchor="b">
+            <a:normAutofit/>
+          </a:bodyPr>
+          <a:lstStyle/>
+          <a:p>
+            <a:pPr algn="ctr"/>
+            <a:r>
+              <a:rPr lang="en-US" sz="4800"/>
+              <a:t>Relational Operators</a:t>
+            </a:r>
+          </a:p>
+        </p:txBody>
+      </p:sp>
+      <p:pic>
+        <p:nvPicPr>
+          <p:cNvPr id="5" name="Content Placeholder 4" descr="A screenshot of a cell phone&#10;&#10;Description automatically generated">
+            <a:extLst>
+              <a:ext uri="{FF2B5EF4-FFF2-40B4-BE49-F238E27FC236}">
+                <a16:creationId xmlns:a16="http://schemas.microsoft.com/office/drawing/2014/main" id="{B68BA11A-3E53-4C85-9248-715DD590AC7F}"/>
+              </a:ext>
+            </a:extLst>
+          </p:cNvPr>
+          <p:cNvPicPr>
+            <a:picLocks noGrp="1" noChangeAspect="1"/>
+          </p:cNvPicPr>
+          <p:nvPr>
+            <p:ph idx="1"/>
+          </p:nvPr>
+        </p:nvPicPr>
+        <p:blipFill>
+          <a:blip r:embed="rId2"/>
+          <a:stretch>
+            <a:fillRect/>
+          </a:stretch>
+        </p:blipFill>
+        <p:spPr>
+          <a:xfrm>
+            <a:off x="1563012" y="934222"/>
+            <a:ext cx="7133945" cy="3299450"/>
+          </a:xfrm>
+          <a:prstGeom prst="rect">
+            <a:avLst/>
+          </a:prstGeom>
+        </p:spPr>
+      </p:pic>
+    </p:spTree>
+    <p:extLst>
+      <p:ext uri="{BB962C8B-B14F-4D97-AF65-F5344CB8AC3E}">
+        <p14:creationId xmlns:p14="http://schemas.microsoft.com/office/powerpoint/2010/main" val="2954317718"/>
+      </p:ext>
+    </p:extLst>
+  </p:cSld>
+  <p:clrMapOvr>
+    <a:masterClrMapping/>
+  </p:clrMapOvr>
+</p:sld>
+</file>
+
+<file path=ppt/slides/slide13.xml><?xml version="1.0" encoding="utf-8"?>
+<p:sld xmlns:a="http://schemas.openxmlformats.org/drawingml/2006/main" xmlns:r="http://schemas.openxmlformats.org/officeDocument/2006/relationships" xmlns:p="http://schemas.openxmlformats.org/presentationml/2006/main">
+  <p:cSld>
+    <p:bg>
+      <p:bgPr>
+        <a:solidFill>
+          <a:schemeClr val="bg1"/>
+        </a:solidFill>
+        <a:effectLst/>
+      </p:bgPr>
+    </p:bg>
+    <p:spTree>
+      <p:nvGrpSpPr>
+        <p:cNvPr id="1" name=""/>
+        <p:cNvGrpSpPr/>
+        <p:nvPr/>
+      </p:nvGrpSpPr>
+      <p:grpSpPr>
+        <a:xfrm>
+          <a:off x="0" y="0"/>
+          <a:ext cx="0" cy="0"/>
+          <a:chOff x="0" y="0"/>
+          <a:chExt cx="0" cy="0"/>
+        </a:xfrm>
+      </p:grpSpPr>
+      <p:grpSp>
+        <p:nvGrpSpPr>
+          <p:cNvPr id="25" name="Group 24">
+            <a:extLst>
+              <a:ext uri="{FF2B5EF4-FFF2-40B4-BE49-F238E27FC236}">
+                <a16:creationId xmlns:a16="http://schemas.microsoft.com/office/drawing/2014/main" id="{A4D026A2-7476-44B0-9648-BB98882F7BA3}"/>
+              </a:ext>
+              <a:ext uri="{C183D7F6-B498-43B3-948B-1728B52AA6E4}">
+                <adec:decorative xmlns:adec="http://schemas.microsoft.com/office/drawing/2017/decorative" val="1"/>
+              </a:ext>
+            </a:extLst>
+          </p:cNvPr>
+          <p:cNvGrpSpPr>
+            <a:grpSpLocks noGrp="1" noUngrp="1" noRot="1" noChangeAspect="1" noMove="1" noResize="1"/>
+          </p:cNvGrpSpPr>
+          <p:nvPr>
+            <p:extLst>
+              <p:ext uri="{386F3935-93C4-4BCD-93E2-E3B085C9AB24}">
+                <p16:designElem xmlns:p16="http://schemas.microsoft.com/office/powerpoint/2015/main" val="1"/>
+              </p:ext>
+            </p:extLst>
+          </p:nvPr>
+        </p:nvGrpSpPr>
+        <p:grpSpPr>
+          <a:xfrm>
+            <a:off x="0" y="-8467"/>
+            <a:ext cx="12192000" cy="6866467"/>
+            <a:chOff x="0" y="-8467"/>
+            <a:chExt cx="12192000" cy="6866467"/>
+          </a:xfrm>
+        </p:grpSpPr>
+        <p:cxnSp>
+          <p:nvCxnSpPr>
+            <p:cNvPr id="26" name="Straight Connector 25">
+              <a:extLst>
+                <a:ext uri="{FF2B5EF4-FFF2-40B4-BE49-F238E27FC236}">
+                  <a16:creationId xmlns:a16="http://schemas.microsoft.com/office/drawing/2014/main" id="{48F8FC21-0A44-4045-95A1-B7935DBC603D}"/>
+                </a:ext>
+                <a:ext uri="{C183D7F6-B498-43B3-948B-1728B52AA6E4}">
+                  <adec:decorative xmlns:adec="http://schemas.microsoft.com/office/drawing/2017/decorative" val="1"/>
+                </a:ext>
+              </a:extLst>
+            </p:cNvPr>
+            <p:cNvCxnSpPr/>
+            <p:nvPr>
+              <p:extLst>
+                <p:ext uri="{386F3935-93C4-4BCD-93E2-E3B085C9AB24}">
+                  <p16:designElem xmlns:p16="http://schemas.microsoft.com/office/powerpoint/2015/main" val="1"/>
+                </p:ext>
+              </p:extLst>
+            </p:nvPr>
+          </p:nvCxnSpPr>
+          <p:spPr>
+            <a:xfrm>
+              <a:off x="9371012" y="0"/>
+              <a:ext cx="1219200" cy="6858000"/>
+            </a:xfrm>
+            <a:prstGeom prst="line">
+              <a:avLst/>
+            </a:prstGeom>
+            <a:ln w="9525">
+              <a:solidFill>
+                <a:schemeClr val="accent1">
+                  <a:alpha val="70000"/>
+                </a:schemeClr>
+              </a:solidFill>
+            </a:ln>
+          </p:spPr>
+          <p:style>
+            <a:lnRef idx="2">
+              <a:schemeClr val="accent1"/>
+            </a:lnRef>
+            <a:fillRef idx="0">
+              <a:schemeClr val="accent1"/>
+            </a:fillRef>
+            <a:effectRef idx="1">
+              <a:schemeClr val="accent1"/>
+            </a:effectRef>
+            <a:fontRef idx="minor">
+              <a:schemeClr val="tx1"/>
+            </a:fontRef>
+          </p:style>
+        </p:cxnSp>
+        <p:cxnSp>
+          <p:nvCxnSpPr>
+            <p:cNvPr id="27" name="Straight Connector 26">
+              <a:extLst>
+                <a:ext uri="{FF2B5EF4-FFF2-40B4-BE49-F238E27FC236}">
+                  <a16:creationId xmlns:a16="http://schemas.microsoft.com/office/drawing/2014/main" id="{0209B962-CD29-4D46-A7B0-10F6C7CF1C0F}"/>
+                </a:ext>
+                <a:ext uri="{C183D7F6-B498-43B3-948B-1728B52AA6E4}">
+                  <adec:decorative xmlns:adec="http://schemas.microsoft.com/office/drawing/2017/decorative" val="1"/>
+                </a:ext>
+              </a:extLst>
+            </p:cNvPr>
+            <p:cNvCxnSpPr/>
+            <p:nvPr>
+              <p:extLst>
+                <p:ext uri="{386F3935-93C4-4BCD-93E2-E3B085C9AB24}">
+                  <p16:designElem xmlns:p16="http://schemas.microsoft.com/office/powerpoint/2015/main" val="1"/>
+                </p:ext>
+              </p:extLst>
+            </p:nvPr>
+          </p:nvCxnSpPr>
+          <p:spPr>
+            <a:xfrm flipH="1">
+              <a:off x="7425267" y="3681413"/>
+              <a:ext cx="4763558" cy="3176587"/>
+            </a:xfrm>
+            <a:prstGeom prst="line">
+              <a:avLst/>
+            </a:prstGeom>
+            <a:ln w="9525">
+              <a:solidFill>
+                <a:schemeClr val="accent1">
+                  <a:alpha val="70000"/>
+                </a:schemeClr>
+              </a:solidFill>
+            </a:ln>
+          </p:spPr>
+          <p:style>
+            <a:lnRef idx="2">
+              <a:schemeClr val="accent1"/>
+            </a:lnRef>
+            <a:fillRef idx="0">
+              <a:schemeClr val="accent1"/>
+            </a:fillRef>
+            <a:effectRef idx="1">
+              <a:schemeClr val="accent1"/>
+            </a:effectRef>
+            <a:fontRef idx="minor">
+              <a:schemeClr val="tx1"/>
+            </a:fontRef>
+          </p:style>
+        </p:cxnSp>
+        <p:sp>
+          <p:nvSpPr>
+            <p:cNvPr id="28" name="Rectangle 23">
+              <a:extLst>
+                <a:ext uri="{FF2B5EF4-FFF2-40B4-BE49-F238E27FC236}">
+                  <a16:creationId xmlns:a16="http://schemas.microsoft.com/office/drawing/2014/main" id="{CC8D40CF-4D47-411D-A8B7-0E4B29E9832B}"/>
+                </a:ext>
+                <a:ext uri="{C183D7F6-B498-43B3-948B-1728B52AA6E4}">
+                  <adec:decorative xmlns:adec="http://schemas.microsoft.com/office/drawing/2017/decorative" val="1"/>
+                </a:ext>
+              </a:extLst>
+            </p:cNvPr>
+            <p:cNvSpPr/>
+            <p:nvPr>
+              <p:extLst>
+                <p:ext uri="{386F3935-93C4-4BCD-93E2-E3B085C9AB24}">
+                  <p16:designElem xmlns:p16="http://schemas.microsoft.com/office/powerpoint/2015/main" val="1"/>
+                </p:ext>
+              </p:extLst>
+            </p:nvPr>
+          </p:nvSpPr>
+          <p:spPr>
+            <a:xfrm>
+              <a:off x="9181476" y="-8467"/>
+              <a:ext cx="3007349" cy="6866467"/>
+            </a:xfrm>
+            <a:custGeom>
+              <a:avLst/>
+              <a:gdLst/>
+              <a:ahLst/>
+              <a:cxnLst/>
+              <a:rect l="l" t="t" r="r" b="b"/>
+              <a:pathLst>
+                <a:path w="3007349" h="6866467">
+                  <a:moveTo>
+                    <a:pt x="2045532" y="0"/>
+                  </a:moveTo>
+                  <a:lnTo>
+                    <a:pt x="3007349" y="0"/>
+                  </a:lnTo>
+                  <a:lnTo>
+                    <a:pt x="3007349" y="6866467"/>
+                  </a:lnTo>
+                  <a:lnTo>
+                    <a:pt x="0" y="6866467"/>
+                  </a:lnTo>
+                  <a:lnTo>
+                    <a:pt x="2045532" y="0"/>
+                  </a:lnTo>
+                  <a:close/>
+                </a:path>
+              </a:pathLst>
+            </a:custGeom>
+            <a:solidFill>
+              <a:schemeClr val="accent1">
+                <a:alpha val="36000"/>
+              </a:schemeClr>
+            </a:solidFill>
+            <a:ln>
+              <a:noFill/>
+            </a:ln>
+            <a:effectLst/>
+          </p:spPr>
+          <p:style>
+            <a:lnRef idx="1">
+              <a:schemeClr val="accent1"/>
+            </a:lnRef>
+            <a:fillRef idx="3">
+              <a:schemeClr val="accent1"/>
+            </a:fillRef>
+            <a:effectRef idx="2">
+              <a:schemeClr val="accent1"/>
+            </a:effectRef>
+            <a:fontRef idx="minor">
+              <a:schemeClr val="lt1"/>
+            </a:fontRef>
+          </p:style>
+        </p:sp>
+        <p:sp>
+          <p:nvSpPr>
+            <p:cNvPr id="29" name="Rectangle 25">
+              <a:extLst>
+                <a:ext uri="{FF2B5EF4-FFF2-40B4-BE49-F238E27FC236}">
+                  <a16:creationId xmlns:a16="http://schemas.microsoft.com/office/drawing/2014/main" id="{9B48A2AD-5257-4384-A7F5-A1EE4E6883A5}"/>
+                </a:ext>
+                <a:ext uri="{C183D7F6-B498-43B3-948B-1728B52AA6E4}">
+                  <adec:decorative xmlns:adec="http://schemas.microsoft.com/office/drawing/2017/decorative" val="1"/>
+                </a:ext>
+              </a:extLst>
+            </p:cNvPr>
+            <p:cNvSpPr/>
+            <p:nvPr>
+              <p:extLst>
+                <p:ext uri="{386F3935-93C4-4BCD-93E2-E3B085C9AB24}">
+                  <p16:designElem xmlns:p16="http://schemas.microsoft.com/office/powerpoint/2015/main" val="1"/>
+                </p:ext>
+              </p:extLst>
+            </p:nvPr>
+          </p:nvSpPr>
+          <p:spPr>
+            <a:xfrm>
+              <a:off x="9603442" y="-8467"/>
+              <a:ext cx="2588558" cy="6866467"/>
+            </a:xfrm>
+            <a:custGeom>
+              <a:avLst/>
+              <a:gdLst/>
+              <a:ahLst/>
+              <a:cxnLst/>
+              <a:rect l="l" t="t" r="r" b="b"/>
+              <a:pathLst>
+                <a:path w="2573311" h="6866467">
+                  <a:moveTo>
+                    <a:pt x="0" y="0"/>
+                  </a:moveTo>
+                  <a:lnTo>
+                    <a:pt x="2573311" y="0"/>
+                  </a:lnTo>
+                  <a:lnTo>
+                    <a:pt x="2573311" y="6866467"/>
+                  </a:lnTo>
+                  <a:lnTo>
+                    <a:pt x="1202336" y="6866467"/>
+                  </a:lnTo>
+                  <a:lnTo>
+                    <a:pt x="0" y="0"/>
+                  </a:lnTo>
+                  <a:close/>
+                </a:path>
+              </a:pathLst>
+            </a:custGeom>
+            <a:solidFill>
+              <a:schemeClr val="accent1">
+                <a:alpha val="20000"/>
+              </a:schemeClr>
+            </a:solidFill>
+            <a:ln>
+              <a:noFill/>
+            </a:ln>
+            <a:effectLst/>
+          </p:spPr>
+          <p:style>
+            <a:lnRef idx="1">
+              <a:schemeClr val="accent1"/>
+            </a:lnRef>
+            <a:fillRef idx="3">
+              <a:schemeClr val="accent1"/>
+            </a:fillRef>
+            <a:effectRef idx="2">
+              <a:schemeClr val="accent1"/>
+            </a:effectRef>
+            <a:fontRef idx="minor">
+              <a:schemeClr val="lt1"/>
+            </a:fontRef>
+          </p:style>
+        </p:sp>
+        <p:sp>
+          <p:nvSpPr>
+            <p:cNvPr id="30" name="Isosceles Triangle 29">
+              <a:extLst>
+                <a:ext uri="{FF2B5EF4-FFF2-40B4-BE49-F238E27FC236}">
+                  <a16:creationId xmlns:a16="http://schemas.microsoft.com/office/drawing/2014/main" id="{04C26DE3-844C-47DA-831E-E7D7BF617EC2}"/>
+                </a:ext>
+                <a:ext uri="{C183D7F6-B498-43B3-948B-1728B52AA6E4}">
+                  <adec:decorative xmlns:adec="http://schemas.microsoft.com/office/drawing/2017/decorative" val="1"/>
+                </a:ext>
+              </a:extLst>
+            </p:cNvPr>
+            <p:cNvSpPr/>
+            <p:nvPr>
+              <p:extLst>
+                <p:ext uri="{386F3935-93C4-4BCD-93E2-E3B085C9AB24}">
+                  <p16:designElem xmlns:p16="http://schemas.microsoft.com/office/powerpoint/2015/main" val="1"/>
+                </p:ext>
+              </p:extLst>
+            </p:nvPr>
+          </p:nvSpPr>
+          <p:spPr>
+            <a:xfrm>
+              <a:off x="8932333" y="3048000"/>
+              <a:ext cx="3259667" cy="3810000"/>
+            </a:xfrm>
+            <a:prstGeom prst="triangle">
+              <a:avLst>
+                <a:gd name="adj" fmla="val 100000"/>
+              </a:avLst>
+            </a:prstGeom>
+            <a:solidFill>
+              <a:schemeClr val="accent1">
+                <a:lumMod val="75000"/>
+                <a:alpha val="66000"/>
+              </a:schemeClr>
+            </a:solidFill>
+            <a:ln>
+              <a:noFill/>
+            </a:ln>
+            <a:effectLst/>
+          </p:spPr>
+          <p:style>
+            <a:lnRef idx="1">
+              <a:schemeClr val="accent1"/>
+            </a:lnRef>
+            <a:fillRef idx="3">
+              <a:schemeClr val="accent1"/>
+            </a:fillRef>
+            <a:effectRef idx="2">
+              <a:schemeClr val="accent1"/>
+            </a:effectRef>
+            <a:fontRef idx="minor">
+              <a:schemeClr val="lt1"/>
+            </a:fontRef>
+          </p:style>
+        </p:sp>
+        <p:sp>
+          <p:nvSpPr>
+            <p:cNvPr id="31" name="Rectangle 27">
+              <a:extLst>
+                <a:ext uri="{FF2B5EF4-FFF2-40B4-BE49-F238E27FC236}">
+                  <a16:creationId xmlns:a16="http://schemas.microsoft.com/office/drawing/2014/main" id="{922D975E-0684-4AA6-9FB7-929B250D5389}"/>
+                </a:ext>
+                <a:ext uri="{C183D7F6-B498-43B3-948B-1728B52AA6E4}">
+                  <adec:decorative xmlns:adec="http://schemas.microsoft.com/office/drawing/2017/decorative" val="1"/>
+                </a:ext>
+              </a:extLst>
+            </p:cNvPr>
+            <p:cNvSpPr/>
+            <p:nvPr>
+              <p:extLst>
+                <p:ext uri="{386F3935-93C4-4BCD-93E2-E3B085C9AB24}">
+                  <p16:designElem xmlns:p16="http://schemas.microsoft.com/office/powerpoint/2015/main" val="1"/>
+                </p:ext>
+              </p:extLst>
+            </p:nvPr>
+          </p:nvSpPr>
+          <p:spPr>
+            <a:xfrm>
+              <a:off x="9334500" y="-8467"/>
+              <a:ext cx="2854326" cy="6866467"/>
+            </a:xfrm>
+            <a:custGeom>
+              <a:avLst/>
+              <a:gdLst/>
+              <a:ahLst/>
+              <a:cxnLst/>
+              <a:rect l="l" t="t" r="r" b="b"/>
+              <a:pathLst>
+                <a:path w="2858013" h="6866467">
+                  <a:moveTo>
+                    <a:pt x="0" y="0"/>
+                  </a:moveTo>
+                  <a:lnTo>
+                    <a:pt x="2858013" y="0"/>
+                  </a:lnTo>
+                  <a:lnTo>
+                    <a:pt x="2858013" y="6866467"/>
+                  </a:lnTo>
+                  <a:lnTo>
+                    <a:pt x="2473942" y="6866467"/>
+                  </a:lnTo>
+                  <a:lnTo>
+                    <a:pt x="0" y="0"/>
+                  </a:lnTo>
+                  <a:close/>
+                </a:path>
+              </a:pathLst>
+            </a:custGeom>
+            <a:solidFill>
+              <a:schemeClr val="accent1">
+                <a:lumMod val="75000"/>
+                <a:alpha val="50000"/>
+              </a:schemeClr>
+            </a:solidFill>
+            <a:ln>
+              <a:noFill/>
+            </a:ln>
+            <a:effectLst/>
+          </p:spPr>
+          <p:style>
+            <a:lnRef idx="1">
+              <a:schemeClr val="accent1"/>
+            </a:lnRef>
+            <a:fillRef idx="3">
+              <a:schemeClr val="accent1"/>
+            </a:fillRef>
+            <a:effectRef idx="2">
+              <a:schemeClr val="accent1"/>
+            </a:effectRef>
+            <a:fontRef idx="minor">
+              <a:schemeClr val="lt1"/>
+            </a:fontRef>
+          </p:style>
+        </p:sp>
+        <p:sp>
+          <p:nvSpPr>
+            <p:cNvPr id="32" name="Rectangle 28">
+              <a:extLst>
+                <a:ext uri="{FF2B5EF4-FFF2-40B4-BE49-F238E27FC236}">
+                  <a16:creationId xmlns:a16="http://schemas.microsoft.com/office/drawing/2014/main" id="{38ED5A9A-F0C7-4547-BC1E-22FC89BD26D1}"/>
+                </a:ext>
+                <a:ext uri="{C183D7F6-B498-43B3-948B-1728B52AA6E4}">
+                  <adec:decorative xmlns:adec="http://schemas.microsoft.com/office/drawing/2017/decorative" val="1"/>
+                </a:ext>
+              </a:extLst>
+            </p:cNvPr>
+            <p:cNvSpPr/>
+            <p:nvPr>
+              <p:extLst>
+                <p:ext uri="{386F3935-93C4-4BCD-93E2-E3B085C9AB24}">
+                  <p16:designElem xmlns:p16="http://schemas.microsoft.com/office/powerpoint/2015/main" val="1"/>
+                </p:ext>
+              </p:extLst>
+            </p:nvPr>
+          </p:nvSpPr>
+          <p:spPr>
+            <a:xfrm>
+              <a:off x="10898730" y="-8467"/>
+              <a:ext cx="1290094" cy="6866467"/>
+            </a:xfrm>
+            <a:custGeom>
+              <a:avLst/>
+              <a:gdLst/>
+              <a:ahLst/>
+              <a:cxnLst/>
+              <a:rect l="l" t="t" r="r" b="b"/>
+              <a:pathLst>
+                <a:path w="1290094" h="6858000">
+                  <a:moveTo>
+                    <a:pt x="1019735" y="0"/>
+                  </a:moveTo>
+                  <a:lnTo>
+                    <a:pt x="1290094" y="0"/>
+                  </a:lnTo>
+                  <a:lnTo>
+                    <a:pt x="1290094" y="6858000"/>
+                  </a:lnTo>
+                  <a:lnTo>
+                    <a:pt x="0" y="6858000"/>
+                  </a:lnTo>
+                  <a:lnTo>
+                    <a:pt x="1019735" y="0"/>
+                  </a:lnTo>
+                  <a:close/>
+                </a:path>
+              </a:pathLst>
+            </a:custGeom>
+            <a:solidFill>
+              <a:schemeClr val="accent2">
+                <a:alpha val="70000"/>
+              </a:schemeClr>
+            </a:solidFill>
+            <a:ln>
+              <a:noFill/>
+            </a:ln>
+            <a:effectLst/>
+          </p:spPr>
+          <p:style>
+            <a:lnRef idx="1">
+              <a:schemeClr val="accent1"/>
+            </a:lnRef>
+            <a:fillRef idx="3">
+              <a:schemeClr val="accent1"/>
+            </a:fillRef>
+            <a:effectRef idx="2">
+              <a:schemeClr val="accent1"/>
+            </a:effectRef>
+            <a:fontRef idx="minor">
+              <a:schemeClr val="lt1"/>
+            </a:fontRef>
+          </p:style>
+        </p:sp>
+        <p:sp>
+          <p:nvSpPr>
+            <p:cNvPr id="33" name="Rectangle 29">
+              <a:extLst>
+                <a:ext uri="{FF2B5EF4-FFF2-40B4-BE49-F238E27FC236}">
+                  <a16:creationId xmlns:a16="http://schemas.microsoft.com/office/drawing/2014/main" id="{2D743765-A245-4349-A5CE-4AB5F078F91E}"/>
+                </a:ext>
+                <a:ext uri="{C183D7F6-B498-43B3-948B-1728B52AA6E4}">
+                  <adec:decorative xmlns:adec="http://schemas.microsoft.com/office/drawing/2017/decorative" val="1"/>
+                </a:ext>
+              </a:extLst>
+            </p:cNvPr>
+            <p:cNvSpPr/>
+            <p:nvPr>
+              <p:extLst>
+                <p:ext uri="{386F3935-93C4-4BCD-93E2-E3B085C9AB24}">
+                  <p16:designElem xmlns:p16="http://schemas.microsoft.com/office/powerpoint/2015/main" val="1"/>
+                </p:ext>
+              </p:extLst>
+            </p:nvPr>
+          </p:nvSpPr>
+          <p:spPr>
+            <a:xfrm>
+              <a:off x="10938999" y="-8467"/>
+              <a:ext cx="1249825" cy="6866467"/>
+            </a:xfrm>
+            <a:custGeom>
+              <a:avLst/>
+              <a:gdLst/>
+              <a:ahLst/>
+              <a:cxnLst/>
+              <a:rect l="l" t="t" r="r" b="b"/>
+              <a:pathLst>
+                <a:path w="1249825" h="6858000">
+                  <a:moveTo>
+                    <a:pt x="0" y="0"/>
+                  </a:moveTo>
+                  <a:lnTo>
+                    <a:pt x="1249825" y="0"/>
+                  </a:lnTo>
+                  <a:lnTo>
+                    <a:pt x="1249825" y="6858000"/>
+                  </a:lnTo>
+                  <a:lnTo>
+                    <a:pt x="1109382" y="6858000"/>
+                  </a:lnTo>
+                  <a:lnTo>
+                    <a:pt x="0" y="0"/>
+                  </a:lnTo>
+                  <a:close/>
+                </a:path>
+              </a:pathLst>
+            </a:custGeom>
+            <a:solidFill>
+              <a:schemeClr val="accent2">
+                <a:lumMod val="75000"/>
+                <a:alpha val="80000"/>
+              </a:schemeClr>
+            </a:solidFill>
+            <a:ln>
+              <a:noFill/>
+            </a:ln>
+            <a:effectLst/>
+          </p:spPr>
+          <p:style>
+            <a:lnRef idx="1">
+              <a:schemeClr val="accent1"/>
+            </a:lnRef>
+            <a:fillRef idx="3">
+              <a:schemeClr val="accent1"/>
+            </a:fillRef>
+            <a:effectRef idx="2">
+              <a:schemeClr val="accent1"/>
+            </a:effectRef>
+            <a:fontRef idx="minor">
+              <a:schemeClr val="lt1"/>
+            </a:fontRef>
+          </p:style>
+        </p:sp>
+        <p:sp>
+          <p:nvSpPr>
+            <p:cNvPr id="34" name="Isosceles Triangle 33">
+              <a:extLst>
+                <a:ext uri="{FF2B5EF4-FFF2-40B4-BE49-F238E27FC236}">
+                  <a16:creationId xmlns:a16="http://schemas.microsoft.com/office/drawing/2014/main" id="{0AF7217B-D042-44D2-9FC7-71FAB6651A47}"/>
+                </a:ext>
+                <a:ext uri="{C183D7F6-B498-43B3-948B-1728B52AA6E4}">
+                  <adec:decorative xmlns:adec="http://schemas.microsoft.com/office/drawing/2017/decorative" val="1"/>
+                </a:ext>
+              </a:extLst>
+            </p:cNvPr>
+            <p:cNvSpPr/>
+            <p:nvPr>
+              <p:extLst>
+                <p:ext uri="{386F3935-93C4-4BCD-93E2-E3B085C9AB24}">
+                  <p16:designElem xmlns:p16="http://schemas.microsoft.com/office/powerpoint/2015/main" val="1"/>
+                </p:ext>
+              </p:extLst>
+            </p:nvPr>
+          </p:nvSpPr>
+          <p:spPr>
+            <a:xfrm>
+              <a:off x="10371666" y="3589867"/>
+              <a:ext cx="1817159" cy="3268133"/>
+            </a:xfrm>
+            <a:prstGeom prst="triangle">
+              <a:avLst>
+                <a:gd name="adj" fmla="val 100000"/>
+              </a:avLst>
+            </a:prstGeom>
+            <a:solidFill>
+              <a:schemeClr val="accent1">
+                <a:lumMod val="75000"/>
+                <a:alpha val="66000"/>
+              </a:schemeClr>
+            </a:solidFill>
+            <a:ln>
+              <a:noFill/>
+            </a:ln>
+            <a:effectLst/>
+          </p:spPr>
+          <p:style>
+            <a:lnRef idx="1">
+              <a:schemeClr val="accent1"/>
+            </a:lnRef>
+            <a:fillRef idx="3">
+              <a:schemeClr val="accent1"/>
+            </a:fillRef>
+            <a:effectRef idx="2">
+              <a:schemeClr val="accent1"/>
+            </a:effectRef>
+            <a:fontRef idx="minor">
+              <a:schemeClr val="lt1"/>
+            </a:fontRef>
+          </p:style>
+        </p:sp>
+        <p:sp>
+          <p:nvSpPr>
+            <p:cNvPr id="35" name="Isosceles Triangle 34">
+              <a:extLst>
+                <a:ext uri="{FF2B5EF4-FFF2-40B4-BE49-F238E27FC236}">
+                  <a16:creationId xmlns:a16="http://schemas.microsoft.com/office/drawing/2014/main" id="{1CC9171B-8BEB-48B1-B9BE-E9584522D074}"/>
+                </a:ext>
+                <a:ext uri="{C183D7F6-B498-43B3-948B-1728B52AA6E4}">
+                  <adec:decorative xmlns:adec="http://schemas.microsoft.com/office/drawing/2017/decorative" val="1"/>
+                </a:ext>
+              </a:extLst>
+            </p:cNvPr>
+            <p:cNvSpPr/>
+            <p:nvPr>
+              <p:extLst>
+                <p:ext uri="{386F3935-93C4-4BCD-93E2-E3B085C9AB24}">
+                  <p16:designElem xmlns:p16="http://schemas.microsoft.com/office/powerpoint/2015/main" val="1"/>
+                </p:ext>
+              </p:extLst>
+            </p:nvPr>
+          </p:nvSpPr>
+          <p:spPr>
+            <a:xfrm>
+              <a:off x="0" y="4013200"/>
+              <a:ext cx="448733" cy="2844800"/>
+            </a:xfrm>
+            <a:prstGeom prst="triangle">
+              <a:avLst>
+                <a:gd name="adj" fmla="val 0"/>
+              </a:avLst>
+            </a:prstGeom>
+            <a:solidFill>
+              <a:schemeClr val="accent1">
+                <a:alpha val="70000"/>
+              </a:schemeClr>
+            </a:solidFill>
+            <a:ln>
+              <a:noFill/>
+            </a:ln>
+            <a:effectLst/>
+          </p:spPr>
+          <p:style>
+            <a:lnRef idx="1">
+              <a:schemeClr val="accent1"/>
+            </a:lnRef>
+            <a:fillRef idx="3">
+              <a:schemeClr val="accent1"/>
+            </a:fillRef>
+            <a:effectRef idx="2">
+              <a:schemeClr val="accent1"/>
+            </a:effectRef>
+            <a:fontRef idx="minor">
+              <a:schemeClr val="lt1"/>
+            </a:fontRef>
+          </p:style>
+        </p:sp>
+      </p:grpSp>
+      <p:pic>
+        <p:nvPicPr>
+          <p:cNvPr id="5" name="Content Placeholder 4" descr="A screenshot of a cell phone&#10;&#10;Description automatically generated">
+            <a:extLst>
+              <a:ext uri="{FF2B5EF4-FFF2-40B4-BE49-F238E27FC236}">
+                <a16:creationId xmlns:a16="http://schemas.microsoft.com/office/drawing/2014/main" id="{D2AAC767-0B95-4ADC-B423-A46D87804B25}"/>
+              </a:ext>
+            </a:extLst>
+          </p:cNvPr>
+          <p:cNvPicPr>
+            <a:picLocks noGrp="1" noChangeAspect="1"/>
+          </p:cNvPicPr>
+          <p:nvPr>
+            <p:ph idx="1"/>
+          </p:nvPr>
+        </p:nvPicPr>
+        <p:blipFill>
+          <a:blip r:embed="rId2"/>
+          <a:stretch>
+            <a:fillRect/>
+          </a:stretch>
+        </p:blipFill>
+        <p:spPr>
+          <a:xfrm>
+            <a:off x="1977338" y="1066377"/>
+            <a:ext cx="6139733" cy="4604800"/>
+          </a:xfrm>
+          <a:prstGeom prst="rect">
+            <a:avLst/>
+          </a:prstGeom>
+        </p:spPr>
+      </p:pic>
+    </p:spTree>
+    <p:extLst>
+      <p:ext uri="{BB962C8B-B14F-4D97-AF65-F5344CB8AC3E}">
+        <p14:creationId xmlns:p14="http://schemas.microsoft.com/office/powerpoint/2010/main" val="1219639411"/>
+      </p:ext>
+    </p:extLst>
+  </p:cSld>
+  <p:clrMapOvr>
+    <a:masterClrMapping/>
+  </p:clrMapOvr>
+</p:sld>
+</file>
+
+<file path=ppt/slides/slide14.xml><?xml version="1.0" encoding="utf-8"?>
+<p:sld xmlns:a="http://schemas.openxmlformats.org/drawingml/2006/main" xmlns:r="http://schemas.openxmlformats.org/officeDocument/2006/relationships" xmlns:p="http://schemas.openxmlformats.org/presentationml/2006/main">
+  <p:cSld>
+    <p:bg>
+      <p:bgPr>
+        <a:solidFill>
+          <a:schemeClr val="bg1"/>
+        </a:solidFill>
+        <a:effectLst/>
+      </p:bgPr>
+    </p:bg>
+    <p:spTree>
+      <p:nvGrpSpPr>
+        <p:cNvPr id="1" name=""/>
+        <p:cNvGrpSpPr/>
+        <p:nvPr/>
+      </p:nvGrpSpPr>
+      <p:grpSpPr>
+        <a:xfrm>
+          <a:off x="0" y="0"/>
+          <a:ext cx="0" cy="0"/>
+          <a:chOff x="0" y="0"/>
+          <a:chExt cx="0" cy="0"/>
+        </a:xfrm>
+      </p:grpSpPr>
+      <p:grpSp>
+        <p:nvGrpSpPr>
+          <p:cNvPr id="27" name="Group 26">
+            <a:extLst>
+              <a:ext uri="{FF2B5EF4-FFF2-40B4-BE49-F238E27FC236}">
+                <a16:creationId xmlns:a16="http://schemas.microsoft.com/office/drawing/2014/main" id="{A4D026A2-7476-44B0-9648-BB98882F7BA3}"/>
+              </a:ext>
+              <a:ext uri="{C183D7F6-B498-43B3-948B-1728B52AA6E4}">
+                <adec:decorative xmlns:adec="http://schemas.microsoft.com/office/drawing/2017/decorative" val="1"/>
+              </a:ext>
+            </a:extLst>
+          </p:cNvPr>
+          <p:cNvGrpSpPr>
+            <a:grpSpLocks noGrp="1" noUngrp="1" noRot="1" noChangeAspect="1" noMove="1" noResize="1"/>
+          </p:cNvGrpSpPr>
+          <p:nvPr>
+            <p:extLst>
+              <p:ext uri="{386F3935-93C4-4BCD-93E2-E3B085C9AB24}">
+                <p16:designElem xmlns:p16="http://schemas.microsoft.com/office/powerpoint/2015/main" val="1"/>
+              </p:ext>
+            </p:extLst>
+          </p:nvPr>
+        </p:nvGrpSpPr>
+        <p:grpSpPr>
+          <a:xfrm>
+            <a:off x="0" y="-8467"/>
+            <a:ext cx="12192000" cy="6866467"/>
+            <a:chOff x="0" y="-8467"/>
+            <a:chExt cx="12192000" cy="6866467"/>
+          </a:xfrm>
+        </p:grpSpPr>
+        <p:cxnSp>
+          <p:nvCxnSpPr>
+            <p:cNvPr id="28" name="Straight Connector 27">
+              <a:extLst>
+                <a:ext uri="{FF2B5EF4-FFF2-40B4-BE49-F238E27FC236}">
+                  <a16:creationId xmlns:a16="http://schemas.microsoft.com/office/drawing/2014/main" id="{48F8FC21-0A44-4045-95A1-B7935DBC603D}"/>
+                </a:ext>
+                <a:ext uri="{C183D7F6-B498-43B3-948B-1728B52AA6E4}">
+                  <adec:decorative xmlns:adec="http://schemas.microsoft.com/office/drawing/2017/decorative" val="1"/>
+                </a:ext>
+              </a:extLst>
+            </p:cNvPr>
+            <p:cNvCxnSpPr/>
+            <p:nvPr>
+              <p:extLst>
+                <p:ext uri="{386F3935-93C4-4BCD-93E2-E3B085C9AB24}">
+                  <p16:designElem xmlns:p16="http://schemas.microsoft.com/office/powerpoint/2015/main" val="1"/>
+                </p:ext>
+              </p:extLst>
+            </p:nvPr>
+          </p:nvCxnSpPr>
+          <p:spPr>
+            <a:xfrm>
+              <a:off x="9371012" y="0"/>
+              <a:ext cx="1219200" cy="6858000"/>
+            </a:xfrm>
+            <a:prstGeom prst="line">
+              <a:avLst/>
+            </a:prstGeom>
+            <a:ln w="9525">
+              <a:solidFill>
+                <a:schemeClr val="accent1">
+                  <a:alpha val="70000"/>
+                </a:schemeClr>
+              </a:solidFill>
+            </a:ln>
+          </p:spPr>
+          <p:style>
+            <a:lnRef idx="2">
+              <a:schemeClr val="accent1"/>
+            </a:lnRef>
+            <a:fillRef idx="0">
+              <a:schemeClr val="accent1"/>
+            </a:fillRef>
+            <a:effectRef idx="1">
+              <a:schemeClr val="accent1"/>
+            </a:effectRef>
+            <a:fontRef idx="minor">
+              <a:schemeClr val="tx1"/>
+            </a:fontRef>
+          </p:style>
+        </p:cxnSp>
+        <p:cxnSp>
+          <p:nvCxnSpPr>
+            <p:cNvPr id="29" name="Straight Connector 28">
+              <a:extLst>
+                <a:ext uri="{FF2B5EF4-FFF2-40B4-BE49-F238E27FC236}">
+                  <a16:creationId xmlns:a16="http://schemas.microsoft.com/office/drawing/2014/main" id="{0209B962-CD29-4D46-A7B0-10F6C7CF1C0F}"/>
+                </a:ext>
+                <a:ext uri="{C183D7F6-B498-43B3-948B-1728B52AA6E4}">
+                  <adec:decorative xmlns:adec="http://schemas.microsoft.com/office/drawing/2017/decorative" val="1"/>
+                </a:ext>
+              </a:extLst>
+            </p:cNvPr>
+            <p:cNvCxnSpPr/>
+            <p:nvPr>
+              <p:extLst>
+                <p:ext uri="{386F3935-93C4-4BCD-93E2-E3B085C9AB24}">
+                  <p16:designElem xmlns:p16="http://schemas.microsoft.com/office/powerpoint/2015/main" val="1"/>
+                </p:ext>
+              </p:extLst>
+            </p:nvPr>
+          </p:nvCxnSpPr>
+          <p:spPr>
+            <a:xfrm flipH="1">
+              <a:off x="7425267" y="3681413"/>
+              <a:ext cx="4763558" cy="3176587"/>
+            </a:xfrm>
+            <a:prstGeom prst="line">
+              <a:avLst/>
+            </a:prstGeom>
+            <a:ln w="9525">
+              <a:solidFill>
+                <a:schemeClr val="accent1">
+                  <a:alpha val="70000"/>
+                </a:schemeClr>
+              </a:solidFill>
+            </a:ln>
+          </p:spPr>
+          <p:style>
+            <a:lnRef idx="2">
+              <a:schemeClr val="accent1"/>
+            </a:lnRef>
+            <a:fillRef idx="0">
+              <a:schemeClr val="accent1"/>
+            </a:fillRef>
+            <a:effectRef idx="1">
+              <a:schemeClr val="accent1"/>
+            </a:effectRef>
+            <a:fontRef idx="minor">
+              <a:schemeClr val="tx1"/>
+            </a:fontRef>
+          </p:style>
+        </p:cxnSp>
+        <p:sp>
+          <p:nvSpPr>
+            <p:cNvPr id="30" name="Rectangle 23">
+              <a:extLst>
+                <a:ext uri="{FF2B5EF4-FFF2-40B4-BE49-F238E27FC236}">
+                  <a16:creationId xmlns:a16="http://schemas.microsoft.com/office/drawing/2014/main" id="{CC8D40CF-4D47-411D-A8B7-0E4B29E9832B}"/>
+                </a:ext>
+                <a:ext uri="{C183D7F6-B498-43B3-948B-1728B52AA6E4}">
+                  <adec:decorative xmlns:adec="http://schemas.microsoft.com/office/drawing/2017/decorative" val="1"/>
+                </a:ext>
+              </a:extLst>
+            </p:cNvPr>
+            <p:cNvSpPr/>
+            <p:nvPr>
+              <p:extLst>
+                <p:ext uri="{386F3935-93C4-4BCD-93E2-E3B085C9AB24}">
+                  <p16:designElem xmlns:p16="http://schemas.microsoft.com/office/powerpoint/2015/main" val="1"/>
+                </p:ext>
+              </p:extLst>
+            </p:nvPr>
+          </p:nvSpPr>
+          <p:spPr>
+            <a:xfrm>
+              <a:off x="9181476" y="-8467"/>
+              <a:ext cx="3007349" cy="6866467"/>
+            </a:xfrm>
+            <a:custGeom>
+              <a:avLst/>
+              <a:gdLst/>
+              <a:ahLst/>
+              <a:cxnLst/>
+              <a:rect l="l" t="t" r="r" b="b"/>
+              <a:pathLst>
+                <a:path w="3007349" h="6866467">
+                  <a:moveTo>
+                    <a:pt x="2045532" y="0"/>
+                  </a:moveTo>
+                  <a:lnTo>
+                    <a:pt x="3007349" y="0"/>
+                  </a:lnTo>
+                  <a:lnTo>
+                    <a:pt x="3007349" y="6866467"/>
+                  </a:lnTo>
+                  <a:lnTo>
+                    <a:pt x="0" y="6866467"/>
+                  </a:lnTo>
+                  <a:lnTo>
+                    <a:pt x="2045532" y="0"/>
+                  </a:lnTo>
+                  <a:close/>
+                </a:path>
+              </a:pathLst>
+            </a:custGeom>
+            <a:solidFill>
+              <a:schemeClr val="accent1">
+                <a:alpha val="36000"/>
+              </a:schemeClr>
+            </a:solidFill>
+            <a:ln>
+              <a:noFill/>
+            </a:ln>
+            <a:effectLst/>
+          </p:spPr>
+          <p:style>
+            <a:lnRef idx="1">
+              <a:schemeClr val="accent1"/>
+            </a:lnRef>
+            <a:fillRef idx="3">
+              <a:schemeClr val="accent1"/>
+            </a:fillRef>
+            <a:effectRef idx="2">
+              <a:schemeClr val="accent1"/>
+            </a:effectRef>
+            <a:fontRef idx="minor">
+              <a:schemeClr val="lt1"/>
+            </a:fontRef>
+          </p:style>
+        </p:sp>
+        <p:sp>
+          <p:nvSpPr>
+            <p:cNvPr id="31" name="Rectangle 25">
+              <a:extLst>
+                <a:ext uri="{FF2B5EF4-FFF2-40B4-BE49-F238E27FC236}">
+                  <a16:creationId xmlns:a16="http://schemas.microsoft.com/office/drawing/2014/main" id="{9B48A2AD-5257-4384-A7F5-A1EE4E6883A5}"/>
+                </a:ext>
+                <a:ext uri="{C183D7F6-B498-43B3-948B-1728B52AA6E4}">
+                  <adec:decorative xmlns:adec="http://schemas.microsoft.com/office/drawing/2017/decorative" val="1"/>
+                </a:ext>
+              </a:extLst>
+            </p:cNvPr>
+            <p:cNvSpPr/>
+            <p:nvPr>
+              <p:extLst>
+                <p:ext uri="{386F3935-93C4-4BCD-93E2-E3B085C9AB24}">
+                  <p16:designElem xmlns:p16="http://schemas.microsoft.com/office/powerpoint/2015/main" val="1"/>
+                </p:ext>
+              </p:extLst>
+            </p:nvPr>
+          </p:nvSpPr>
+          <p:spPr>
+            <a:xfrm>
+              <a:off x="9603442" y="-8467"/>
+              <a:ext cx="2588558" cy="6866467"/>
+            </a:xfrm>
+            <a:custGeom>
+              <a:avLst/>
+              <a:gdLst/>
+              <a:ahLst/>
+              <a:cxnLst/>
+              <a:rect l="l" t="t" r="r" b="b"/>
+              <a:pathLst>
+                <a:path w="2573311" h="6866467">
+                  <a:moveTo>
+                    <a:pt x="0" y="0"/>
+                  </a:moveTo>
+                  <a:lnTo>
+                    <a:pt x="2573311" y="0"/>
+                  </a:lnTo>
+                  <a:lnTo>
+                    <a:pt x="2573311" y="6866467"/>
+                  </a:lnTo>
+                  <a:lnTo>
+                    <a:pt x="1202336" y="6866467"/>
+                  </a:lnTo>
+                  <a:lnTo>
+                    <a:pt x="0" y="0"/>
+                  </a:lnTo>
+                  <a:close/>
+                </a:path>
+              </a:pathLst>
+            </a:custGeom>
+            <a:solidFill>
+              <a:schemeClr val="accent1">
+                <a:alpha val="20000"/>
+              </a:schemeClr>
+            </a:solidFill>
+            <a:ln>
+              <a:noFill/>
+            </a:ln>
+            <a:effectLst/>
+          </p:spPr>
+          <p:style>
+            <a:lnRef idx="1">
+              <a:schemeClr val="accent1"/>
+            </a:lnRef>
+            <a:fillRef idx="3">
+              <a:schemeClr val="accent1"/>
+            </a:fillRef>
+            <a:effectRef idx="2">
+              <a:schemeClr val="accent1"/>
+            </a:effectRef>
+            <a:fontRef idx="minor">
+              <a:schemeClr val="lt1"/>
+            </a:fontRef>
+          </p:style>
+        </p:sp>
+        <p:sp>
+          <p:nvSpPr>
+            <p:cNvPr id="32" name="Isosceles Triangle 31">
+              <a:extLst>
+                <a:ext uri="{FF2B5EF4-FFF2-40B4-BE49-F238E27FC236}">
+                  <a16:creationId xmlns:a16="http://schemas.microsoft.com/office/drawing/2014/main" id="{04C26DE3-844C-47DA-831E-E7D7BF617EC2}"/>
+                </a:ext>
+                <a:ext uri="{C183D7F6-B498-43B3-948B-1728B52AA6E4}">
+                  <adec:decorative xmlns:adec="http://schemas.microsoft.com/office/drawing/2017/decorative" val="1"/>
+                </a:ext>
+              </a:extLst>
+            </p:cNvPr>
+            <p:cNvSpPr/>
+            <p:nvPr>
+              <p:extLst>
+                <p:ext uri="{386F3935-93C4-4BCD-93E2-E3B085C9AB24}">
+                  <p16:designElem xmlns:p16="http://schemas.microsoft.com/office/powerpoint/2015/main" val="1"/>
+                </p:ext>
+              </p:extLst>
+            </p:nvPr>
+          </p:nvSpPr>
+          <p:spPr>
+            <a:xfrm>
+              <a:off x="8932333" y="3048000"/>
+              <a:ext cx="3259667" cy="3810000"/>
+            </a:xfrm>
+            <a:prstGeom prst="triangle">
+              <a:avLst>
+                <a:gd name="adj" fmla="val 100000"/>
+              </a:avLst>
+            </a:prstGeom>
+            <a:solidFill>
+              <a:schemeClr val="accent1">
+                <a:lumMod val="75000"/>
+                <a:alpha val="66000"/>
+              </a:schemeClr>
+            </a:solidFill>
+            <a:ln>
+              <a:noFill/>
+            </a:ln>
+            <a:effectLst/>
+          </p:spPr>
+          <p:style>
+            <a:lnRef idx="1">
+              <a:schemeClr val="accent1"/>
+            </a:lnRef>
+            <a:fillRef idx="3">
+              <a:schemeClr val="accent1"/>
+            </a:fillRef>
+            <a:effectRef idx="2">
+              <a:schemeClr val="accent1"/>
+            </a:effectRef>
+            <a:fontRef idx="minor">
+              <a:schemeClr val="lt1"/>
+            </a:fontRef>
+          </p:style>
+        </p:sp>
+        <p:sp>
+          <p:nvSpPr>
+            <p:cNvPr id="33" name="Rectangle 27">
+              <a:extLst>
+                <a:ext uri="{FF2B5EF4-FFF2-40B4-BE49-F238E27FC236}">
+                  <a16:creationId xmlns:a16="http://schemas.microsoft.com/office/drawing/2014/main" id="{922D975E-0684-4AA6-9FB7-929B250D5389}"/>
+                </a:ext>
+                <a:ext uri="{C183D7F6-B498-43B3-948B-1728B52AA6E4}">
+                  <adec:decorative xmlns:adec="http://schemas.microsoft.com/office/drawing/2017/decorative" val="1"/>
+                </a:ext>
+              </a:extLst>
+            </p:cNvPr>
+            <p:cNvSpPr/>
+            <p:nvPr>
+              <p:extLst>
+                <p:ext uri="{386F3935-93C4-4BCD-93E2-E3B085C9AB24}">
+                  <p16:designElem xmlns:p16="http://schemas.microsoft.com/office/powerpoint/2015/main" val="1"/>
+                </p:ext>
+              </p:extLst>
+            </p:nvPr>
+          </p:nvSpPr>
+          <p:spPr>
+            <a:xfrm>
+              <a:off x="9334500" y="-8467"/>
+              <a:ext cx="2854326" cy="6866467"/>
+            </a:xfrm>
+            <a:custGeom>
+              <a:avLst/>
+              <a:gdLst/>
+              <a:ahLst/>
+              <a:cxnLst/>
+              <a:rect l="l" t="t" r="r" b="b"/>
+              <a:pathLst>
+                <a:path w="2858013" h="6866467">
+                  <a:moveTo>
+                    <a:pt x="0" y="0"/>
+                  </a:moveTo>
+                  <a:lnTo>
+                    <a:pt x="2858013" y="0"/>
+                  </a:lnTo>
+                  <a:lnTo>
+                    <a:pt x="2858013" y="6866467"/>
+                  </a:lnTo>
+                  <a:lnTo>
+                    <a:pt x="2473942" y="6866467"/>
+                  </a:lnTo>
+                  <a:lnTo>
+                    <a:pt x="0" y="0"/>
+                  </a:lnTo>
+                  <a:close/>
+                </a:path>
+              </a:pathLst>
+            </a:custGeom>
+            <a:solidFill>
+              <a:schemeClr val="accent1">
+                <a:lumMod val="75000"/>
+                <a:alpha val="50000"/>
+              </a:schemeClr>
+            </a:solidFill>
+            <a:ln>
+              <a:noFill/>
+            </a:ln>
+            <a:effectLst/>
+          </p:spPr>
+          <p:style>
+            <a:lnRef idx="1">
+              <a:schemeClr val="accent1"/>
+            </a:lnRef>
+            <a:fillRef idx="3">
+              <a:schemeClr val="accent1"/>
+            </a:fillRef>
+            <a:effectRef idx="2">
+              <a:schemeClr val="accent1"/>
+            </a:effectRef>
+            <a:fontRef idx="minor">
+              <a:schemeClr val="lt1"/>
+            </a:fontRef>
+          </p:style>
+        </p:sp>
+        <p:sp>
+          <p:nvSpPr>
+            <p:cNvPr id="34" name="Rectangle 28">
+              <a:extLst>
+                <a:ext uri="{FF2B5EF4-FFF2-40B4-BE49-F238E27FC236}">
+                  <a16:creationId xmlns:a16="http://schemas.microsoft.com/office/drawing/2014/main" id="{38ED5A9A-F0C7-4547-BC1E-22FC89BD26D1}"/>
+                </a:ext>
+                <a:ext uri="{C183D7F6-B498-43B3-948B-1728B52AA6E4}">
+                  <adec:decorative xmlns:adec="http://schemas.microsoft.com/office/drawing/2017/decorative" val="1"/>
+                </a:ext>
+              </a:extLst>
+            </p:cNvPr>
+            <p:cNvSpPr/>
+            <p:nvPr>
+              <p:extLst>
+                <p:ext uri="{386F3935-93C4-4BCD-93E2-E3B085C9AB24}">
+                  <p16:designElem xmlns:p16="http://schemas.microsoft.com/office/powerpoint/2015/main" val="1"/>
+                </p:ext>
+              </p:extLst>
+            </p:nvPr>
+          </p:nvSpPr>
+          <p:spPr>
+            <a:xfrm>
+              <a:off x="10898730" y="-8467"/>
+              <a:ext cx="1290094" cy="6866467"/>
+            </a:xfrm>
+            <a:custGeom>
+              <a:avLst/>
+              <a:gdLst/>
+              <a:ahLst/>
+              <a:cxnLst/>
+              <a:rect l="l" t="t" r="r" b="b"/>
+              <a:pathLst>
+                <a:path w="1290094" h="6858000">
+                  <a:moveTo>
+                    <a:pt x="1019735" y="0"/>
+                  </a:moveTo>
+                  <a:lnTo>
+                    <a:pt x="1290094" y="0"/>
+                  </a:lnTo>
+                  <a:lnTo>
+                    <a:pt x="1290094" y="6858000"/>
+                  </a:lnTo>
+                  <a:lnTo>
+                    <a:pt x="0" y="6858000"/>
+                  </a:lnTo>
+                  <a:lnTo>
+                    <a:pt x="1019735" y="0"/>
+                  </a:lnTo>
+                  <a:close/>
+                </a:path>
+              </a:pathLst>
+            </a:custGeom>
+            <a:solidFill>
+              <a:schemeClr val="accent2">
+                <a:alpha val="70000"/>
+              </a:schemeClr>
+            </a:solidFill>
+            <a:ln>
+              <a:noFill/>
+            </a:ln>
+            <a:effectLst/>
+          </p:spPr>
+          <p:style>
+            <a:lnRef idx="1">
+              <a:schemeClr val="accent1"/>
+            </a:lnRef>
+            <a:fillRef idx="3">
+              <a:schemeClr val="accent1"/>
+            </a:fillRef>
+            <a:effectRef idx="2">
+              <a:schemeClr val="accent1"/>
+            </a:effectRef>
+            <a:fontRef idx="minor">
+              <a:schemeClr val="lt1"/>
+            </a:fontRef>
+          </p:style>
+        </p:sp>
+        <p:sp>
+          <p:nvSpPr>
+            <p:cNvPr id="35" name="Rectangle 29">
+              <a:extLst>
+                <a:ext uri="{FF2B5EF4-FFF2-40B4-BE49-F238E27FC236}">
+                  <a16:creationId xmlns:a16="http://schemas.microsoft.com/office/drawing/2014/main" id="{2D743765-A245-4349-A5CE-4AB5F078F91E}"/>
+                </a:ext>
+                <a:ext uri="{C183D7F6-B498-43B3-948B-1728B52AA6E4}">
+                  <adec:decorative xmlns:adec="http://schemas.microsoft.com/office/drawing/2017/decorative" val="1"/>
+                </a:ext>
+              </a:extLst>
+            </p:cNvPr>
+            <p:cNvSpPr/>
+            <p:nvPr>
+              <p:extLst>
+                <p:ext uri="{386F3935-93C4-4BCD-93E2-E3B085C9AB24}">
+                  <p16:designElem xmlns:p16="http://schemas.microsoft.com/office/powerpoint/2015/main" val="1"/>
+                </p:ext>
+              </p:extLst>
+            </p:nvPr>
+          </p:nvSpPr>
+          <p:spPr>
+            <a:xfrm>
+              <a:off x="10938999" y="-8467"/>
+              <a:ext cx="1249825" cy="6866467"/>
+            </a:xfrm>
+            <a:custGeom>
+              <a:avLst/>
+              <a:gdLst/>
+              <a:ahLst/>
+              <a:cxnLst/>
+              <a:rect l="l" t="t" r="r" b="b"/>
+              <a:pathLst>
+                <a:path w="1249825" h="6858000">
+                  <a:moveTo>
+                    <a:pt x="0" y="0"/>
+                  </a:moveTo>
+                  <a:lnTo>
+                    <a:pt x="1249825" y="0"/>
+                  </a:lnTo>
+                  <a:lnTo>
+                    <a:pt x="1249825" y="6858000"/>
+                  </a:lnTo>
+                  <a:lnTo>
+                    <a:pt x="1109382" y="6858000"/>
+                  </a:lnTo>
+                  <a:lnTo>
+                    <a:pt x="0" y="0"/>
+                  </a:lnTo>
+                  <a:close/>
+                </a:path>
+              </a:pathLst>
+            </a:custGeom>
+            <a:solidFill>
+              <a:schemeClr val="accent2">
+                <a:lumMod val="75000"/>
+                <a:alpha val="80000"/>
+              </a:schemeClr>
+            </a:solidFill>
+            <a:ln>
+              <a:noFill/>
+            </a:ln>
+            <a:effectLst/>
+          </p:spPr>
+          <p:style>
+            <a:lnRef idx="1">
+              <a:schemeClr val="accent1"/>
+            </a:lnRef>
+            <a:fillRef idx="3">
+              <a:schemeClr val="accent1"/>
+            </a:fillRef>
+            <a:effectRef idx="2">
+              <a:schemeClr val="accent1"/>
+            </a:effectRef>
+            <a:fontRef idx="minor">
+              <a:schemeClr val="lt1"/>
+            </a:fontRef>
+          </p:style>
+        </p:sp>
+        <p:sp>
+          <p:nvSpPr>
+            <p:cNvPr id="36" name="Isosceles Triangle 35">
+              <a:extLst>
+                <a:ext uri="{FF2B5EF4-FFF2-40B4-BE49-F238E27FC236}">
+                  <a16:creationId xmlns:a16="http://schemas.microsoft.com/office/drawing/2014/main" id="{0AF7217B-D042-44D2-9FC7-71FAB6651A47}"/>
+                </a:ext>
+                <a:ext uri="{C183D7F6-B498-43B3-948B-1728B52AA6E4}">
+                  <adec:decorative xmlns:adec="http://schemas.microsoft.com/office/drawing/2017/decorative" val="1"/>
+                </a:ext>
+              </a:extLst>
+            </p:cNvPr>
+            <p:cNvSpPr/>
+            <p:nvPr>
+              <p:extLst>
+                <p:ext uri="{386F3935-93C4-4BCD-93E2-E3B085C9AB24}">
+                  <p16:designElem xmlns:p16="http://schemas.microsoft.com/office/powerpoint/2015/main" val="1"/>
+                </p:ext>
+              </p:extLst>
+            </p:nvPr>
+          </p:nvSpPr>
+          <p:spPr>
+            <a:xfrm>
+              <a:off x="10371666" y="3589867"/>
+              <a:ext cx="1817159" cy="3268133"/>
+            </a:xfrm>
+            <a:prstGeom prst="triangle">
+              <a:avLst>
+                <a:gd name="adj" fmla="val 100000"/>
+              </a:avLst>
+            </a:prstGeom>
+            <a:solidFill>
+              <a:schemeClr val="accent1">
+                <a:lumMod val="75000"/>
+                <a:alpha val="66000"/>
+              </a:schemeClr>
+            </a:solidFill>
+            <a:ln>
+              <a:noFill/>
+            </a:ln>
+            <a:effectLst/>
+          </p:spPr>
+          <p:style>
+            <a:lnRef idx="1">
+              <a:schemeClr val="accent1"/>
+            </a:lnRef>
+            <a:fillRef idx="3">
+              <a:schemeClr val="accent1"/>
+            </a:fillRef>
+            <a:effectRef idx="2">
+              <a:schemeClr val="accent1"/>
+            </a:effectRef>
+            <a:fontRef idx="minor">
+              <a:schemeClr val="lt1"/>
+            </a:fontRef>
+          </p:style>
+        </p:sp>
+        <p:sp>
+          <p:nvSpPr>
+            <p:cNvPr id="37" name="Isosceles Triangle 36">
+              <a:extLst>
+                <a:ext uri="{FF2B5EF4-FFF2-40B4-BE49-F238E27FC236}">
+                  <a16:creationId xmlns:a16="http://schemas.microsoft.com/office/drawing/2014/main" id="{1CC9171B-8BEB-48B1-B9BE-E9584522D074}"/>
+                </a:ext>
+                <a:ext uri="{C183D7F6-B498-43B3-948B-1728B52AA6E4}">
+                  <adec:decorative xmlns:adec="http://schemas.microsoft.com/office/drawing/2017/decorative" val="1"/>
+                </a:ext>
+              </a:extLst>
+            </p:cNvPr>
+            <p:cNvSpPr/>
+            <p:nvPr>
+              <p:extLst>
+                <p:ext uri="{386F3935-93C4-4BCD-93E2-E3B085C9AB24}">
+                  <p16:designElem xmlns:p16="http://schemas.microsoft.com/office/powerpoint/2015/main" val="1"/>
+                </p:ext>
+              </p:extLst>
+            </p:nvPr>
+          </p:nvSpPr>
+          <p:spPr>
+            <a:xfrm>
+              <a:off x="0" y="4013200"/>
+              <a:ext cx="448733" cy="2844800"/>
+            </a:xfrm>
+            <a:prstGeom prst="triangle">
+              <a:avLst>
+                <a:gd name="adj" fmla="val 0"/>
+              </a:avLst>
+            </a:prstGeom>
+            <a:solidFill>
+              <a:schemeClr val="accent1">
+                <a:alpha val="70000"/>
+              </a:schemeClr>
+            </a:solidFill>
+            <a:ln>
+              <a:noFill/>
+            </a:ln>
+            <a:effectLst/>
+          </p:spPr>
+          <p:style>
+            <a:lnRef idx="1">
+              <a:schemeClr val="accent1"/>
+            </a:lnRef>
+            <a:fillRef idx="3">
+              <a:schemeClr val="accent1"/>
+            </a:fillRef>
+            <a:effectRef idx="2">
+              <a:schemeClr val="accent1"/>
+            </a:effectRef>
+            <a:fontRef idx="minor">
+              <a:schemeClr val="lt1"/>
+            </a:fontRef>
+          </p:style>
+        </p:sp>
+      </p:grpSp>
+      <p:pic>
+        <p:nvPicPr>
+          <p:cNvPr id="5" name="Content Placeholder 4" descr="A screenshot of a social media post&#10;&#10;Description automatically generated">
+            <a:extLst>
+              <a:ext uri="{FF2B5EF4-FFF2-40B4-BE49-F238E27FC236}">
+                <a16:creationId xmlns:a16="http://schemas.microsoft.com/office/drawing/2014/main" id="{3F70C587-C039-4136-9F40-4FDB814E6114}"/>
+              </a:ext>
+            </a:extLst>
+          </p:cNvPr>
+          <p:cNvPicPr>
+            <a:picLocks noGrp="1" noChangeAspect="1"/>
+          </p:cNvPicPr>
+          <p:nvPr>
+            <p:ph idx="1"/>
+          </p:nvPr>
+        </p:nvPicPr>
+        <p:blipFill rotWithShape="1">
+          <a:blip r:embed="rId2"/>
+          <a:srcRect t="1418" b="15188"/>
+          <a:stretch/>
+        </p:blipFill>
+        <p:spPr>
+          <a:xfrm>
+            <a:off x="638126" y="1584796"/>
+            <a:ext cx="7478946" cy="3567961"/>
+          </a:xfrm>
+          <a:prstGeom prst="rect">
+            <a:avLst/>
+          </a:prstGeom>
+        </p:spPr>
+      </p:pic>
+    </p:spTree>
+    <p:extLst>
+      <p:ext uri="{BB962C8B-B14F-4D97-AF65-F5344CB8AC3E}">
+        <p14:creationId xmlns:p14="http://schemas.microsoft.com/office/powerpoint/2010/main" val="682107469"/>
+      </p:ext>
+    </p:extLst>
+  </p:cSld>
+  <p:clrMapOvr>
+    <a:masterClrMapping/>
+  </p:clrMapOvr>
+</p:sld>
+</file>
+
+<file path=ppt/slides/slide15.xml><?xml version="1.0" encoding="utf-8"?>
+<p:sld xmlns:a="http://schemas.openxmlformats.org/drawingml/2006/main" xmlns:r="http://schemas.openxmlformats.org/officeDocument/2006/relationships" xmlns:p="http://schemas.openxmlformats.org/presentationml/2006/main">
+  <p:cSld>
+    <p:bg>
+      <p:bgPr>
+        <a:solidFill>
+          <a:schemeClr val="bg1"/>
+        </a:solidFill>
+        <a:effectLst/>
+      </p:bgPr>
+    </p:bg>
+    <p:spTree>
+      <p:nvGrpSpPr>
+        <p:cNvPr id="1" name=""/>
+        <p:cNvGrpSpPr/>
+        <p:nvPr/>
+      </p:nvGrpSpPr>
+      <p:grpSpPr>
+        <a:xfrm>
+          <a:off x="0" y="0"/>
+          <a:ext cx="0" cy="0"/>
+          <a:chOff x="0" y="0"/>
+          <a:chExt cx="0" cy="0"/>
+        </a:xfrm>
+      </p:grpSpPr>
+      <p:grpSp>
+        <p:nvGrpSpPr>
+          <p:cNvPr id="21" name="Group 9">
+            <a:extLst>
+              <a:ext uri="{FF2B5EF4-FFF2-40B4-BE49-F238E27FC236}">
+                <a16:creationId xmlns:a16="http://schemas.microsoft.com/office/drawing/2014/main" id="{4815A7B4-532E-48C9-AC24-D78ACF3339DB}"/>
+              </a:ext>
+              <a:ext uri="{C183D7F6-B498-43B3-948B-1728B52AA6E4}">
+                <adec:decorative xmlns:adec="http://schemas.microsoft.com/office/drawing/2017/decorative" val="1"/>
+              </a:ext>
+            </a:extLst>
+          </p:cNvPr>
+          <p:cNvGrpSpPr>
+            <a:grpSpLocks noGrp="1" noUngrp="1" noRot="1" noChangeAspect="1" noMove="1" noResize="1"/>
+          </p:cNvGrpSpPr>
+          <p:nvPr>
+            <p:extLst>
+              <p:ext uri="{386F3935-93C4-4BCD-93E2-E3B085C9AB24}">
+                <p16:designElem xmlns:p16="http://schemas.microsoft.com/office/powerpoint/2015/main" val="1"/>
+              </p:ext>
+            </p:extLst>
+          </p:nvPr>
+        </p:nvGrpSpPr>
+        <p:grpSpPr>
+          <a:xfrm>
+            <a:off x="0" y="-8467"/>
+            <a:ext cx="12192000" cy="6866467"/>
+            <a:chOff x="0" y="-8467"/>
+            <a:chExt cx="12192000" cy="6866467"/>
+          </a:xfrm>
+        </p:grpSpPr>
+        <p:sp>
+          <p:nvSpPr>
+            <p:cNvPr id="11" name="Freeform 14">
+              <a:extLst>
+                <a:ext uri="{FF2B5EF4-FFF2-40B4-BE49-F238E27FC236}">
+                  <a16:creationId xmlns:a16="http://schemas.microsoft.com/office/drawing/2014/main" id="{D40109F4-CE5C-45F4-856E-F3F69C9FD4E1}"/>
+                </a:ext>
+                <a:ext uri="{C183D7F6-B498-43B3-948B-1728B52AA6E4}">
+                  <adec:decorative xmlns:adec="http://schemas.microsoft.com/office/drawing/2017/decorative" val="1"/>
+                </a:ext>
+              </a:extLst>
+            </p:cNvPr>
+            <p:cNvSpPr/>
+            <p:nvPr>
+              <p:extLst>
+                <p:ext uri="{386F3935-93C4-4BCD-93E2-E3B085C9AB24}">
+                  <p16:designElem xmlns:p16="http://schemas.microsoft.com/office/powerpoint/2015/main" val="1"/>
+                </p:ext>
+              </p:extLst>
+            </p:nvPr>
+          </p:nvSpPr>
+          <p:spPr>
+            <a:xfrm>
+              <a:off x="0" y="-7862"/>
+              <a:ext cx="863600" cy="5698067"/>
+            </a:xfrm>
+            <a:custGeom>
+              <a:avLst/>
+              <a:gdLst/>
+              <a:ahLst/>
+              <a:cxnLst/>
+              <a:rect l="l" t="t" r="r" b="b"/>
+              <a:pathLst>
+                <a:path w="863600" h="5698067">
+                  <a:moveTo>
+                    <a:pt x="0" y="8467"/>
+                  </a:moveTo>
+                  <a:lnTo>
+                    <a:pt x="863600" y="0"/>
+                  </a:lnTo>
+                  <a:lnTo>
+                    <a:pt x="863600" y="16934"/>
+                  </a:lnTo>
+                  <a:lnTo>
+                    <a:pt x="0" y="5698067"/>
+                  </a:lnTo>
+                  <a:lnTo>
+                    <a:pt x="0" y="8467"/>
+                  </a:lnTo>
+                  <a:close/>
+                </a:path>
+              </a:pathLst>
+            </a:custGeom>
+            <a:solidFill>
+              <a:schemeClr val="accent1">
+                <a:alpha val="70000"/>
+              </a:schemeClr>
+            </a:solidFill>
+            <a:ln>
+              <a:noFill/>
+            </a:ln>
+            <a:effectLst/>
+          </p:spPr>
+          <p:style>
+            <a:lnRef idx="1">
+              <a:schemeClr val="accent1"/>
+            </a:lnRef>
+            <a:fillRef idx="3">
+              <a:schemeClr val="accent1"/>
+            </a:fillRef>
+            <a:effectRef idx="2">
+              <a:schemeClr val="accent1"/>
+            </a:effectRef>
+            <a:fontRef idx="minor">
+              <a:schemeClr val="lt1"/>
+            </a:fontRef>
+          </p:style>
+        </p:sp>
+        <p:cxnSp>
+          <p:nvCxnSpPr>
+            <p:cNvPr id="12" name="Straight Connector 11">
+              <a:extLst>
+                <a:ext uri="{FF2B5EF4-FFF2-40B4-BE49-F238E27FC236}">
+                  <a16:creationId xmlns:a16="http://schemas.microsoft.com/office/drawing/2014/main" id="{3CBAA4DE-3D7B-460B-AE98-D9F9990C0B62}"/>
+                </a:ext>
+                <a:ext uri="{C183D7F6-B498-43B3-948B-1728B52AA6E4}">
+                  <adec:decorative xmlns:adec="http://schemas.microsoft.com/office/drawing/2017/decorative" val="1"/>
+                </a:ext>
+              </a:extLst>
+            </p:cNvPr>
+            <p:cNvCxnSpPr/>
+            <p:nvPr>
+              <p:extLst>
+                <p:ext uri="{386F3935-93C4-4BCD-93E2-E3B085C9AB24}">
+                  <p16:designElem xmlns:p16="http://schemas.microsoft.com/office/powerpoint/2015/main" val="1"/>
+                </p:ext>
+              </p:extLst>
+            </p:nvPr>
+          </p:nvCxnSpPr>
+          <p:spPr>
+            <a:xfrm>
+              <a:off x="9371012" y="0"/>
+              <a:ext cx="1219200" cy="6858000"/>
+            </a:xfrm>
+            <a:prstGeom prst="line">
+              <a:avLst/>
+            </a:prstGeom>
+            <a:ln w="9525">
+              <a:solidFill>
+                <a:schemeClr val="accent1">
+                  <a:alpha val="70000"/>
+                </a:schemeClr>
+              </a:solidFill>
+            </a:ln>
+          </p:spPr>
+          <p:style>
+            <a:lnRef idx="2">
+              <a:schemeClr val="accent1"/>
+            </a:lnRef>
+            <a:fillRef idx="0">
+              <a:schemeClr val="accent1"/>
+            </a:fillRef>
+            <a:effectRef idx="1">
+              <a:schemeClr val="accent1"/>
+            </a:effectRef>
+            <a:fontRef idx="minor">
+              <a:schemeClr val="tx1"/>
+            </a:fontRef>
+          </p:style>
+        </p:cxnSp>
+        <p:cxnSp>
+          <p:nvCxnSpPr>
+            <p:cNvPr id="13" name="Straight Connector 12">
+              <a:extLst>
+                <a:ext uri="{FF2B5EF4-FFF2-40B4-BE49-F238E27FC236}">
+                  <a16:creationId xmlns:a16="http://schemas.microsoft.com/office/drawing/2014/main" id="{7BF1ED3E-4F80-4AF6-A41B-44F53DDE610D}"/>
+                </a:ext>
+                <a:ext uri="{C183D7F6-B498-43B3-948B-1728B52AA6E4}">
+                  <adec:decorative xmlns:adec="http://schemas.microsoft.com/office/drawing/2017/decorative" val="1"/>
+                </a:ext>
+              </a:extLst>
+            </p:cNvPr>
+            <p:cNvCxnSpPr/>
+            <p:nvPr>
+              <p:extLst>
+                <p:ext uri="{386F3935-93C4-4BCD-93E2-E3B085C9AB24}">
+                  <p16:designElem xmlns:p16="http://schemas.microsoft.com/office/powerpoint/2015/main" val="1"/>
+                </p:ext>
+              </p:extLst>
+            </p:nvPr>
+          </p:nvCxnSpPr>
+          <p:spPr>
+            <a:xfrm flipH="1">
+              <a:off x="7425267" y="3681413"/>
+              <a:ext cx="4763558" cy="3176587"/>
+            </a:xfrm>
+            <a:prstGeom prst="line">
+              <a:avLst/>
+            </a:prstGeom>
+            <a:ln w="9525">
+              <a:solidFill>
+                <a:schemeClr val="accent1">
+                  <a:alpha val="70000"/>
+                </a:schemeClr>
+              </a:solidFill>
+            </a:ln>
+          </p:spPr>
+          <p:style>
+            <a:lnRef idx="2">
+              <a:schemeClr val="accent1"/>
+            </a:lnRef>
+            <a:fillRef idx="0">
+              <a:schemeClr val="accent1"/>
+            </a:fillRef>
+            <a:effectRef idx="1">
+              <a:schemeClr val="accent1"/>
+            </a:effectRef>
+            <a:fontRef idx="minor">
+              <a:schemeClr val="tx1"/>
+            </a:fontRef>
+          </p:style>
+        </p:cxnSp>
+        <p:sp>
+          <p:nvSpPr>
+            <p:cNvPr id="14" name="Rectangle 23">
+              <a:extLst>
+                <a:ext uri="{FF2B5EF4-FFF2-40B4-BE49-F238E27FC236}">
+                  <a16:creationId xmlns:a16="http://schemas.microsoft.com/office/drawing/2014/main" id="{C0B2D747-3E31-45C5-9A98-A9710A585FBB}"/>
+                </a:ext>
+                <a:ext uri="{C183D7F6-B498-43B3-948B-1728B52AA6E4}">
+                  <adec:decorative xmlns:adec="http://schemas.microsoft.com/office/drawing/2017/decorative" val="1"/>
+                </a:ext>
+              </a:extLst>
+            </p:cNvPr>
+            <p:cNvSpPr/>
+            <p:nvPr>
+              <p:extLst>
+                <p:ext uri="{386F3935-93C4-4BCD-93E2-E3B085C9AB24}">
+                  <p16:designElem xmlns:p16="http://schemas.microsoft.com/office/powerpoint/2015/main" val="1"/>
+                </p:ext>
+              </p:extLst>
+            </p:nvPr>
+          </p:nvSpPr>
+          <p:spPr>
+            <a:xfrm>
+              <a:off x="9181476" y="-8467"/>
+              <a:ext cx="3007349" cy="6866467"/>
+            </a:xfrm>
+            <a:custGeom>
+              <a:avLst/>
+              <a:gdLst/>
+              <a:ahLst/>
+              <a:cxnLst/>
+              <a:rect l="l" t="t" r="r" b="b"/>
+              <a:pathLst>
+                <a:path w="3007349" h="6866467">
+                  <a:moveTo>
+                    <a:pt x="2045532" y="0"/>
+                  </a:moveTo>
+                  <a:lnTo>
+                    <a:pt x="3007349" y="0"/>
+                  </a:lnTo>
+                  <a:lnTo>
+                    <a:pt x="3007349" y="6866467"/>
+                  </a:lnTo>
+                  <a:lnTo>
+                    <a:pt x="0" y="6866467"/>
+                  </a:lnTo>
+                  <a:lnTo>
+                    <a:pt x="2045532" y="0"/>
+                  </a:lnTo>
+                  <a:close/>
+                </a:path>
+              </a:pathLst>
+            </a:custGeom>
+            <a:solidFill>
+              <a:schemeClr val="accent1">
+                <a:alpha val="36000"/>
+              </a:schemeClr>
+            </a:solidFill>
+            <a:ln>
+              <a:noFill/>
+            </a:ln>
+            <a:effectLst/>
+          </p:spPr>
+          <p:style>
+            <a:lnRef idx="1">
+              <a:schemeClr val="accent1"/>
+            </a:lnRef>
+            <a:fillRef idx="3">
+              <a:schemeClr val="accent1"/>
+            </a:fillRef>
+            <a:effectRef idx="2">
+              <a:schemeClr val="accent1"/>
+            </a:effectRef>
+            <a:fontRef idx="minor">
+              <a:schemeClr val="lt1"/>
+            </a:fontRef>
+          </p:style>
+        </p:sp>
+        <p:sp>
+          <p:nvSpPr>
+            <p:cNvPr id="15" name="Rectangle 25">
+              <a:extLst>
+                <a:ext uri="{FF2B5EF4-FFF2-40B4-BE49-F238E27FC236}">
+                  <a16:creationId xmlns:a16="http://schemas.microsoft.com/office/drawing/2014/main" id="{A15FD4BA-3020-462D-8BE8-B3A65B8E492A}"/>
+                </a:ext>
+                <a:ext uri="{C183D7F6-B498-43B3-948B-1728B52AA6E4}">
+                  <adec:decorative xmlns:adec="http://schemas.microsoft.com/office/drawing/2017/decorative" val="1"/>
+                </a:ext>
+              </a:extLst>
+            </p:cNvPr>
+            <p:cNvSpPr/>
+            <p:nvPr>
+              <p:extLst>
+                <p:ext uri="{386F3935-93C4-4BCD-93E2-E3B085C9AB24}">
+                  <p16:designElem xmlns:p16="http://schemas.microsoft.com/office/powerpoint/2015/main" val="1"/>
+                </p:ext>
+              </p:extLst>
+            </p:nvPr>
+          </p:nvSpPr>
+          <p:spPr>
+            <a:xfrm>
+              <a:off x="9603442" y="-8467"/>
+              <a:ext cx="2588558" cy="6866467"/>
+            </a:xfrm>
+            <a:custGeom>
+              <a:avLst/>
+              <a:gdLst/>
+              <a:ahLst/>
+              <a:cxnLst/>
+              <a:rect l="l" t="t" r="r" b="b"/>
+              <a:pathLst>
+                <a:path w="2573311" h="6866467">
+                  <a:moveTo>
+                    <a:pt x="0" y="0"/>
+                  </a:moveTo>
+                  <a:lnTo>
+                    <a:pt x="2573311" y="0"/>
+                  </a:lnTo>
+                  <a:lnTo>
+                    <a:pt x="2573311" y="6866467"/>
+                  </a:lnTo>
+                  <a:lnTo>
+                    <a:pt x="1202336" y="6866467"/>
+                  </a:lnTo>
+                  <a:lnTo>
+                    <a:pt x="0" y="0"/>
+                  </a:lnTo>
+                  <a:close/>
+                </a:path>
+              </a:pathLst>
+            </a:custGeom>
+            <a:solidFill>
+              <a:schemeClr val="accent1">
+                <a:alpha val="20000"/>
+              </a:schemeClr>
+            </a:solidFill>
+            <a:ln>
+              <a:noFill/>
+            </a:ln>
+            <a:effectLst/>
+          </p:spPr>
+          <p:style>
+            <a:lnRef idx="1">
+              <a:schemeClr val="accent1"/>
+            </a:lnRef>
+            <a:fillRef idx="3">
+              <a:schemeClr val="accent1"/>
+            </a:fillRef>
+            <a:effectRef idx="2">
+              <a:schemeClr val="accent1"/>
+            </a:effectRef>
+            <a:fontRef idx="minor">
+              <a:schemeClr val="lt1"/>
+            </a:fontRef>
+          </p:style>
+        </p:sp>
+        <p:sp>
+          <p:nvSpPr>
+            <p:cNvPr id="16" name="Isosceles Triangle 15">
+              <a:extLst>
+                <a:ext uri="{FF2B5EF4-FFF2-40B4-BE49-F238E27FC236}">
+                  <a16:creationId xmlns:a16="http://schemas.microsoft.com/office/drawing/2014/main" id="{A304284A-7318-4DD5-898C-2F6B23C778FA}"/>
+                </a:ext>
+                <a:ext uri="{C183D7F6-B498-43B3-948B-1728B52AA6E4}">
+                  <adec:decorative xmlns:adec="http://schemas.microsoft.com/office/drawing/2017/decorative" val="1"/>
+                </a:ext>
+              </a:extLst>
+            </p:cNvPr>
+            <p:cNvSpPr/>
+            <p:nvPr>
+              <p:extLst>
+                <p:ext uri="{386F3935-93C4-4BCD-93E2-E3B085C9AB24}">
+                  <p16:designElem xmlns:p16="http://schemas.microsoft.com/office/powerpoint/2015/main" val="1"/>
+                </p:ext>
+              </p:extLst>
+            </p:nvPr>
+          </p:nvSpPr>
+          <p:spPr>
+            <a:xfrm>
+              <a:off x="8932333" y="3048000"/>
+              <a:ext cx="3259667" cy="3810000"/>
+            </a:xfrm>
+            <a:prstGeom prst="triangle">
+              <a:avLst>
+                <a:gd name="adj" fmla="val 100000"/>
+              </a:avLst>
+            </a:prstGeom>
+            <a:solidFill>
+              <a:schemeClr val="accent1">
+                <a:lumMod val="75000"/>
+                <a:alpha val="66000"/>
+              </a:schemeClr>
+            </a:solidFill>
+            <a:ln>
+              <a:noFill/>
+            </a:ln>
+            <a:effectLst/>
+          </p:spPr>
+          <p:style>
+            <a:lnRef idx="1">
+              <a:schemeClr val="accent1"/>
+            </a:lnRef>
+            <a:fillRef idx="3">
+              <a:schemeClr val="accent1"/>
+            </a:fillRef>
+            <a:effectRef idx="2">
+              <a:schemeClr val="accent1"/>
+            </a:effectRef>
+            <a:fontRef idx="minor">
+              <a:schemeClr val="lt1"/>
+            </a:fontRef>
+          </p:style>
+        </p:sp>
+        <p:sp>
+          <p:nvSpPr>
+            <p:cNvPr id="17" name="Rectangle 27">
+              <a:extLst>
+                <a:ext uri="{FF2B5EF4-FFF2-40B4-BE49-F238E27FC236}">
+                  <a16:creationId xmlns:a16="http://schemas.microsoft.com/office/drawing/2014/main" id="{9DF48E66-B635-4509-B115-E0987C014EBC}"/>
+                </a:ext>
+                <a:ext uri="{C183D7F6-B498-43B3-948B-1728B52AA6E4}">
+                  <adec:decorative xmlns:adec="http://schemas.microsoft.com/office/drawing/2017/decorative" val="1"/>
+                </a:ext>
+              </a:extLst>
+            </p:cNvPr>
+            <p:cNvSpPr/>
+            <p:nvPr>
+              <p:extLst>
+                <p:ext uri="{386F3935-93C4-4BCD-93E2-E3B085C9AB24}">
+                  <p16:designElem xmlns:p16="http://schemas.microsoft.com/office/powerpoint/2015/main" val="1"/>
+                </p:ext>
+              </p:extLst>
+            </p:nvPr>
+          </p:nvSpPr>
+          <p:spPr>
+            <a:xfrm>
+              <a:off x="9334500" y="-8467"/>
+              <a:ext cx="2854326" cy="6866467"/>
+            </a:xfrm>
+            <a:custGeom>
+              <a:avLst/>
+              <a:gdLst/>
+              <a:ahLst/>
+              <a:cxnLst/>
+              <a:rect l="l" t="t" r="r" b="b"/>
+              <a:pathLst>
+                <a:path w="2858013" h="6866467">
+                  <a:moveTo>
+                    <a:pt x="0" y="0"/>
+                  </a:moveTo>
+                  <a:lnTo>
+                    <a:pt x="2858013" y="0"/>
+                  </a:lnTo>
+                  <a:lnTo>
+                    <a:pt x="2858013" y="6866467"/>
+                  </a:lnTo>
+                  <a:lnTo>
+                    <a:pt x="2473942" y="6866467"/>
+                  </a:lnTo>
+                  <a:lnTo>
+                    <a:pt x="0" y="0"/>
+                  </a:lnTo>
+                  <a:close/>
+                </a:path>
+              </a:pathLst>
+            </a:custGeom>
+            <a:solidFill>
+              <a:schemeClr val="accent1">
+                <a:lumMod val="75000"/>
+                <a:alpha val="50000"/>
+              </a:schemeClr>
+            </a:solidFill>
+            <a:ln>
+              <a:noFill/>
+            </a:ln>
+            <a:effectLst/>
+          </p:spPr>
+          <p:style>
+            <a:lnRef idx="1">
+              <a:schemeClr val="accent1"/>
+            </a:lnRef>
+            <a:fillRef idx="3">
+              <a:schemeClr val="accent1"/>
+            </a:fillRef>
+            <a:effectRef idx="2">
+              <a:schemeClr val="accent1"/>
+            </a:effectRef>
+            <a:fontRef idx="minor">
+              <a:schemeClr val="lt1"/>
+            </a:fontRef>
+          </p:style>
+        </p:sp>
+        <p:sp>
+          <p:nvSpPr>
+            <p:cNvPr id="18" name="Rectangle 28">
+              <a:extLst>
+                <a:ext uri="{FF2B5EF4-FFF2-40B4-BE49-F238E27FC236}">
+                  <a16:creationId xmlns:a16="http://schemas.microsoft.com/office/drawing/2014/main" id="{E3B96D94-5F5A-4F4C-810C-917BF4D266C3}"/>
+                </a:ext>
+                <a:ext uri="{C183D7F6-B498-43B3-948B-1728B52AA6E4}">
+                  <adec:decorative xmlns:adec="http://schemas.microsoft.com/office/drawing/2017/decorative" val="1"/>
+                </a:ext>
+              </a:extLst>
+            </p:cNvPr>
+            <p:cNvSpPr/>
+            <p:nvPr>
+              <p:extLst>
+                <p:ext uri="{386F3935-93C4-4BCD-93E2-E3B085C9AB24}">
+                  <p16:designElem xmlns:p16="http://schemas.microsoft.com/office/powerpoint/2015/main" val="1"/>
+                </p:ext>
+              </p:extLst>
+            </p:nvPr>
+          </p:nvSpPr>
+          <p:spPr>
+            <a:xfrm>
+              <a:off x="10898730" y="-8467"/>
+              <a:ext cx="1290094" cy="6866467"/>
+            </a:xfrm>
+            <a:custGeom>
+              <a:avLst/>
+              <a:gdLst/>
+              <a:ahLst/>
+              <a:cxnLst/>
+              <a:rect l="l" t="t" r="r" b="b"/>
+              <a:pathLst>
+                <a:path w="1290094" h="6858000">
+                  <a:moveTo>
+                    <a:pt x="1019735" y="0"/>
+                  </a:moveTo>
+                  <a:lnTo>
+                    <a:pt x="1290094" y="0"/>
+                  </a:lnTo>
+                  <a:lnTo>
+                    <a:pt x="1290094" y="6858000"/>
+                  </a:lnTo>
+                  <a:lnTo>
+                    <a:pt x="0" y="6858000"/>
+                  </a:lnTo>
+                  <a:lnTo>
+                    <a:pt x="1019735" y="0"/>
+                  </a:lnTo>
+                  <a:close/>
+                </a:path>
+              </a:pathLst>
+            </a:custGeom>
+            <a:solidFill>
+              <a:schemeClr val="accent2">
+                <a:alpha val="70000"/>
+              </a:schemeClr>
+            </a:solidFill>
+            <a:ln>
+              <a:noFill/>
+            </a:ln>
+            <a:effectLst/>
+          </p:spPr>
+          <p:style>
+            <a:lnRef idx="1">
+              <a:schemeClr val="accent1"/>
+            </a:lnRef>
+            <a:fillRef idx="3">
+              <a:schemeClr val="accent1"/>
+            </a:fillRef>
+            <a:effectRef idx="2">
+              <a:schemeClr val="accent1"/>
+            </a:effectRef>
+            <a:fontRef idx="minor">
+              <a:schemeClr val="lt1"/>
+            </a:fontRef>
+          </p:style>
+        </p:sp>
+        <p:sp>
+          <p:nvSpPr>
+            <p:cNvPr id="19" name="Rectangle 29">
+              <a:extLst>
+                <a:ext uri="{FF2B5EF4-FFF2-40B4-BE49-F238E27FC236}">
+                  <a16:creationId xmlns:a16="http://schemas.microsoft.com/office/drawing/2014/main" id="{7F3782D6-BFF8-4389-9D39-A023ADAA92C1}"/>
+                </a:ext>
+                <a:ext uri="{C183D7F6-B498-43B3-948B-1728B52AA6E4}">
+                  <adec:decorative xmlns:adec="http://schemas.microsoft.com/office/drawing/2017/decorative" val="1"/>
+                </a:ext>
+              </a:extLst>
+            </p:cNvPr>
+            <p:cNvSpPr/>
+            <p:nvPr>
+              <p:extLst>
+                <p:ext uri="{386F3935-93C4-4BCD-93E2-E3B085C9AB24}">
+                  <p16:designElem xmlns:p16="http://schemas.microsoft.com/office/powerpoint/2015/main" val="1"/>
+                </p:ext>
+              </p:extLst>
+            </p:nvPr>
+          </p:nvSpPr>
+          <p:spPr>
+            <a:xfrm>
+              <a:off x="10938999" y="-8467"/>
+              <a:ext cx="1249825" cy="6866467"/>
+            </a:xfrm>
+            <a:custGeom>
+              <a:avLst/>
+              <a:gdLst/>
+              <a:ahLst/>
+              <a:cxnLst/>
+              <a:rect l="l" t="t" r="r" b="b"/>
+              <a:pathLst>
+                <a:path w="1249825" h="6858000">
+                  <a:moveTo>
+                    <a:pt x="0" y="0"/>
+                  </a:moveTo>
+                  <a:lnTo>
+                    <a:pt x="1249825" y="0"/>
+                  </a:lnTo>
+                  <a:lnTo>
+                    <a:pt x="1249825" y="6858000"/>
+                  </a:lnTo>
+                  <a:lnTo>
+                    <a:pt x="1109382" y="6858000"/>
+                  </a:lnTo>
+                  <a:lnTo>
+                    <a:pt x="0" y="0"/>
+                  </a:lnTo>
+                  <a:close/>
+                </a:path>
+              </a:pathLst>
+            </a:custGeom>
+            <a:solidFill>
+              <a:schemeClr val="accent2">
+                <a:lumMod val="75000"/>
+                <a:alpha val="80000"/>
+              </a:schemeClr>
+            </a:solidFill>
+            <a:ln>
+              <a:noFill/>
+            </a:ln>
+            <a:effectLst/>
+          </p:spPr>
+          <p:style>
+            <a:lnRef idx="1">
+              <a:schemeClr val="accent1"/>
+            </a:lnRef>
+            <a:fillRef idx="3">
+              <a:schemeClr val="accent1"/>
+            </a:fillRef>
+            <a:effectRef idx="2">
+              <a:schemeClr val="accent1"/>
+            </a:effectRef>
+            <a:fontRef idx="minor">
+              <a:schemeClr val="lt1"/>
+            </a:fontRef>
+          </p:style>
+        </p:sp>
+        <p:sp>
+          <p:nvSpPr>
+            <p:cNvPr id="20" name="Isosceles Triangle 19">
+              <a:extLst>
+                <a:ext uri="{FF2B5EF4-FFF2-40B4-BE49-F238E27FC236}">
+                  <a16:creationId xmlns:a16="http://schemas.microsoft.com/office/drawing/2014/main" id="{ECE162D4-FCAE-441B-B5E9-C91DE62124EF}"/>
+                </a:ext>
+                <a:ext uri="{C183D7F6-B498-43B3-948B-1728B52AA6E4}">
+                  <adec:decorative xmlns:adec="http://schemas.microsoft.com/office/drawing/2017/decorative" val="1"/>
+                </a:ext>
+              </a:extLst>
+            </p:cNvPr>
+            <p:cNvSpPr/>
+            <p:nvPr>
+              <p:extLst>
+                <p:ext uri="{386F3935-93C4-4BCD-93E2-E3B085C9AB24}">
+                  <p16:designElem xmlns:p16="http://schemas.microsoft.com/office/powerpoint/2015/main" val="1"/>
+                </p:ext>
+              </p:extLst>
+            </p:nvPr>
+          </p:nvSpPr>
+          <p:spPr>
+            <a:xfrm>
+              <a:off x="10371666" y="3589867"/>
+              <a:ext cx="1817159" cy="3268133"/>
+            </a:xfrm>
+            <a:prstGeom prst="triangle">
+              <a:avLst>
+                <a:gd name="adj" fmla="val 100000"/>
+              </a:avLst>
+            </a:prstGeom>
+            <a:solidFill>
+              <a:schemeClr val="accent1">
+                <a:lumMod val="75000"/>
+                <a:alpha val="66000"/>
+              </a:schemeClr>
+            </a:solidFill>
+            <a:ln>
+              <a:noFill/>
+            </a:ln>
+            <a:effectLst/>
+          </p:spPr>
+          <p:style>
+            <a:lnRef idx="1">
+              <a:schemeClr val="accent1"/>
+            </a:lnRef>
+            <a:fillRef idx="3">
+              <a:schemeClr val="accent1"/>
+            </a:fillRef>
+            <a:effectRef idx="2">
+              <a:schemeClr val="accent1"/>
+            </a:effectRef>
+            <a:fontRef idx="minor">
+              <a:schemeClr val="lt1"/>
+            </a:fontRef>
+          </p:style>
+        </p:sp>
+      </p:grpSp>
+      <p:sp>
+        <p:nvSpPr>
+          <p:cNvPr id="2" name="Title 1">
+            <a:extLst>
+              <a:ext uri="{FF2B5EF4-FFF2-40B4-BE49-F238E27FC236}">
+                <a16:creationId xmlns:a16="http://schemas.microsoft.com/office/drawing/2014/main" id="{7447E770-2A86-4FBE-8841-578E3B1AF8E5}"/>
+              </a:ext>
+            </a:extLst>
+          </p:cNvPr>
+          <p:cNvSpPr>
+            <a:spLocks noGrp="1"/>
+          </p:cNvSpPr>
+          <p:nvPr>
+            <p:ph type="title"/>
+          </p:nvPr>
+        </p:nvSpPr>
+        <p:spPr>
+          <a:xfrm>
+            <a:off x="1600199" y="4571999"/>
+            <a:ext cx="7673801" cy="1087656"/>
+          </a:xfrm>
+        </p:spPr>
+        <p:txBody>
+          <a:bodyPr vert="horz" lIns="91440" tIns="45720" rIns="91440" bIns="45720" rtlCol="0" anchor="b">
+            <a:normAutofit/>
+          </a:bodyPr>
+          <a:lstStyle/>
+          <a:p>
+            <a:pPr>
+              <a:lnSpc>
+                <a:spcPct val="90000"/>
+              </a:lnSpc>
+            </a:pPr>
+            <a:r>
+              <a:rPr lang="en-US" sz="3400"/>
+              <a:t>Increment and Decrement Operators</a:t>
+            </a:r>
+          </a:p>
+        </p:txBody>
+      </p:sp>
+      <p:pic>
+        <p:nvPicPr>
+          <p:cNvPr id="22" name="Content Placeholder 4" descr="A screenshot of a cell phone&#10;&#10;Description automatically generated">
+            <a:extLst>
+              <a:ext uri="{FF2B5EF4-FFF2-40B4-BE49-F238E27FC236}">
+                <a16:creationId xmlns:a16="http://schemas.microsoft.com/office/drawing/2014/main" id="{9C591183-F5C1-4A26-9932-112062D39166}"/>
+              </a:ext>
+            </a:extLst>
+          </p:cNvPr>
+          <p:cNvPicPr>
+            <a:picLocks noGrp="1" noChangeAspect="1"/>
+          </p:cNvPicPr>
+          <p:nvPr>
+            <p:ph idx="1"/>
+          </p:nvPr>
+        </p:nvPicPr>
+        <p:blipFill>
+          <a:blip r:embed="rId2"/>
+          <a:stretch>
+            <a:fillRect/>
+          </a:stretch>
+        </p:blipFill>
+        <p:spPr>
+          <a:xfrm>
+            <a:off x="1600201" y="609600"/>
+            <a:ext cx="6840108" cy="3642357"/>
+          </a:xfrm>
+          <a:prstGeom prst="rect">
+            <a:avLst/>
+          </a:prstGeom>
+        </p:spPr>
+      </p:pic>
+    </p:spTree>
+    <p:extLst>
+      <p:ext uri="{BB962C8B-B14F-4D97-AF65-F5344CB8AC3E}">
+        <p14:creationId xmlns:p14="http://schemas.microsoft.com/office/powerpoint/2010/main" val="684763441"/>
       </p:ext>
     </p:extLst>
   </p:cSld>

</xml_diff>